<commit_message>
Made animation for electron states
</commit_message>
<xml_diff>
--- a/Animation/Animation.pptx
+++ b/Animation/Animation.pptx
@@ -6,6 +6,7 @@
   </p:sldMasterIdLst>
   <p:sldIdLst>
     <p:sldId id="256" r:id="rId2"/>
+    <p:sldId id="257" r:id="rId3"/>
   </p:sldIdLst>
   <p:sldSz cx="12192000" cy="6858000"/>
   <p:notesSz cx="6858000" cy="9144000"/>
@@ -104,7 +105,81 @@
       </a:defRPr>
     </a:lvl9pPr>
   </p:defaultTextStyle>
+  <p:extLst>
+    <p:ext uri="{EFAFB233-063F-42B5-8137-9DF3F51BA10A}">
+      <p15:sldGuideLst xmlns:p15="http://schemas.microsoft.com/office/powerpoint/2012/main"/>
+    </p:ext>
+  </p:extLst>
 </p:presentation>
+</file>
+
+<file path=ppt/revisionInfo.xml><?xml version="1.0" encoding="utf-8"?>
+<p1510:revInfo xmlns:a="http://schemas.openxmlformats.org/drawingml/2006/main" xmlns:r="http://schemas.openxmlformats.org/officeDocument/2006/relationships" xmlns:p1510="http://schemas.microsoft.com/office/powerpoint/2015/10/main">
+  <p1510:revLst>
+    <p1510:client id="{6EDADB15-9C7A-42F9-9C22-D7323EA05313}" v="1" dt="2023-06-27T08:43:12.002"/>
+  </p1510:revLst>
+</p1510:revInfo>
+</file>
+
+<file path=ppt/changesInfos/changesInfo1.xml><?xml version="1.0" encoding="utf-8"?>
+<pc:chgInfo xmlns:a="http://schemas.openxmlformats.org/drawingml/2006/main" xmlns:r="http://schemas.openxmlformats.org/officeDocument/2006/relationships" xmlns:ac="http://schemas.microsoft.com/office/drawing/2013/main/command" xmlns:pc="http://schemas.microsoft.com/office/powerpoint/2013/main/command">
+  <pc:docChgLst>
+    <pc:chgData name="Emils Zegers" userId="bd5cf22c-0e97-44c0-acad-9bc9915da531" providerId="ADAL" clId="{6EDADB15-9C7A-42F9-9C22-D7323EA05313}"/>
+    <pc:docChg chg="addSld modSld">
+      <pc:chgData name="Emils Zegers" userId="bd5cf22c-0e97-44c0-acad-9bc9915da531" providerId="ADAL" clId="{6EDADB15-9C7A-42F9-9C22-D7323EA05313}" dt="2023-06-27T08:43:12.001" v="1"/>
+      <pc:docMkLst>
+        <pc:docMk/>
+      </pc:docMkLst>
+      <pc:sldChg chg="addSp modSp new modAnim">
+        <pc:chgData name="Emils Zegers" userId="bd5cf22c-0e97-44c0-acad-9bc9915da531" providerId="ADAL" clId="{6EDADB15-9C7A-42F9-9C22-D7323EA05313}" dt="2023-06-27T08:43:12.001" v="1"/>
+        <pc:sldMkLst>
+          <pc:docMk/>
+          <pc:sldMk cId="1374573369" sldId="257"/>
+        </pc:sldMkLst>
+        <pc:picChg chg="add mod">
+          <ac:chgData name="Emils Zegers" userId="bd5cf22c-0e97-44c0-acad-9bc9915da531" providerId="ADAL" clId="{6EDADB15-9C7A-42F9-9C22-D7323EA05313}" dt="2023-06-27T08:43:12.001" v="1"/>
+          <ac:picMkLst>
+            <pc:docMk/>
+            <pc:sldMk cId="1374573369" sldId="257"/>
+            <ac:picMk id="2" creationId="{9F25BF6D-8FD5-3D87-5254-BBAA854DD96E}"/>
+          </ac:picMkLst>
+        </pc:picChg>
+        <pc:picChg chg="add mod">
+          <ac:chgData name="Emils Zegers" userId="bd5cf22c-0e97-44c0-acad-9bc9915da531" providerId="ADAL" clId="{6EDADB15-9C7A-42F9-9C22-D7323EA05313}" dt="2023-06-27T08:43:12.001" v="1"/>
+          <ac:picMkLst>
+            <pc:docMk/>
+            <pc:sldMk cId="1374573369" sldId="257"/>
+            <ac:picMk id="3" creationId="{DC4A7FC8-941A-048F-138A-85CA5F9344C1}"/>
+          </ac:picMkLst>
+        </pc:picChg>
+        <pc:picChg chg="add mod">
+          <ac:chgData name="Emils Zegers" userId="bd5cf22c-0e97-44c0-acad-9bc9915da531" providerId="ADAL" clId="{6EDADB15-9C7A-42F9-9C22-D7323EA05313}" dt="2023-06-27T08:43:12.001" v="1"/>
+          <ac:picMkLst>
+            <pc:docMk/>
+            <pc:sldMk cId="1374573369" sldId="257"/>
+            <ac:picMk id="4" creationId="{699A2C8F-E638-2F65-15B1-9C5EE08BD4E7}"/>
+          </ac:picMkLst>
+        </pc:picChg>
+        <pc:picChg chg="add mod">
+          <ac:chgData name="Emils Zegers" userId="bd5cf22c-0e97-44c0-acad-9bc9915da531" providerId="ADAL" clId="{6EDADB15-9C7A-42F9-9C22-D7323EA05313}" dt="2023-06-27T08:43:12.001" v="1"/>
+          <ac:picMkLst>
+            <pc:docMk/>
+            <pc:sldMk cId="1374573369" sldId="257"/>
+            <ac:picMk id="5" creationId="{BB6E79D4-76A2-22FE-43F7-D28B5FE0F6CD}"/>
+          </ac:picMkLst>
+        </pc:picChg>
+        <pc:picChg chg="add mod">
+          <ac:chgData name="Emils Zegers" userId="bd5cf22c-0e97-44c0-acad-9bc9915da531" providerId="ADAL" clId="{6EDADB15-9C7A-42F9-9C22-D7323EA05313}" dt="2023-06-27T08:43:12.001" v="1"/>
+          <ac:picMkLst>
+            <pc:docMk/>
+            <pc:sldMk cId="1374573369" sldId="257"/>
+            <ac:picMk id="6" creationId="{DBFD008B-7E0A-D6BD-DA3A-03D68B8571A1}"/>
+          </ac:picMkLst>
+        </pc:picChg>
+      </pc:sldChg>
+    </pc:docChg>
+  </pc:docChgLst>
+</pc:chgInfo>
 </file>
 
 <file path=ppt/slideLayouts/slideLayout1.xml><?xml version="1.0" encoding="utf-8"?>
@@ -256,7 +331,7 @@
           <a:p>
             <a:fld id="{15F53109-975B-0047-9CEE-14A150D71685}" type="datetimeFigureOut">
               <a:rPr lang="en-NL" smtClean="0"/>
-              <a:t>26/06/2023</a:t>
+              <a:t>27/06/2023</a:t>
             </a:fld>
             <a:endParaRPr lang="en-NL"/>
           </a:p>
@@ -456,7 +531,7 @@
           <a:p>
             <a:fld id="{15F53109-975B-0047-9CEE-14A150D71685}" type="datetimeFigureOut">
               <a:rPr lang="en-NL" smtClean="0"/>
-              <a:t>26/06/2023</a:t>
+              <a:t>27/06/2023</a:t>
             </a:fld>
             <a:endParaRPr lang="en-NL"/>
           </a:p>
@@ -666,7 +741,7 @@
           <a:p>
             <a:fld id="{15F53109-975B-0047-9CEE-14A150D71685}" type="datetimeFigureOut">
               <a:rPr lang="en-NL" smtClean="0"/>
-              <a:t>26/06/2023</a:t>
+              <a:t>27/06/2023</a:t>
             </a:fld>
             <a:endParaRPr lang="en-NL"/>
           </a:p>
@@ -866,7 +941,7 @@
           <a:p>
             <a:fld id="{15F53109-975B-0047-9CEE-14A150D71685}" type="datetimeFigureOut">
               <a:rPr lang="en-NL" smtClean="0"/>
-              <a:t>26/06/2023</a:t>
+              <a:t>27/06/2023</a:t>
             </a:fld>
             <a:endParaRPr lang="en-NL"/>
           </a:p>
@@ -1142,7 +1217,7 @@
           <a:p>
             <a:fld id="{15F53109-975B-0047-9CEE-14A150D71685}" type="datetimeFigureOut">
               <a:rPr lang="en-NL" smtClean="0"/>
-              <a:t>26/06/2023</a:t>
+              <a:t>27/06/2023</a:t>
             </a:fld>
             <a:endParaRPr lang="en-NL"/>
           </a:p>
@@ -1410,7 +1485,7 @@
           <a:p>
             <a:fld id="{15F53109-975B-0047-9CEE-14A150D71685}" type="datetimeFigureOut">
               <a:rPr lang="en-NL" smtClean="0"/>
-              <a:t>26/06/2023</a:t>
+              <a:t>27/06/2023</a:t>
             </a:fld>
             <a:endParaRPr lang="en-NL"/>
           </a:p>
@@ -1825,7 +1900,7 @@
           <a:p>
             <a:fld id="{15F53109-975B-0047-9CEE-14A150D71685}" type="datetimeFigureOut">
               <a:rPr lang="en-NL" smtClean="0"/>
-              <a:t>26/06/2023</a:t>
+              <a:t>27/06/2023</a:t>
             </a:fld>
             <a:endParaRPr lang="en-NL"/>
           </a:p>
@@ -1967,7 +2042,7 @@
           <a:p>
             <a:fld id="{15F53109-975B-0047-9CEE-14A150D71685}" type="datetimeFigureOut">
               <a:rPr lang="en-NL" smtClean="0"/>
-              <a:t>26/06/2023</a:t>
+              <a:t>27/06/2023</a:t>
             </a:fld>
             <a:endParaRPr lang="en-NL"/>
           </a:p>
@@ -2080,7 +2155,7 @@
           <a:p>
             <a:fld id="{15F53109-975B-0047-9CEE-14A150D71685}" type="datetimeFigureOut">
               <a:rPr lang="en-NL" smtClean="0"/>
-              <a:t>26/06/2023</a:t>
+              <a:t>27/06/2023</a:t>
             </a:fld>
             <a:endParaRPr lang="en-NL"/>
           </a:p>
@@ -2393,7 +2468,7 @@
           <a:p>
             <a:fld id="{15F53109-975B-0047-9CEE-14A150D71685}" type="datetimeFigureOut">
               <a:rPr lang="en-NL" smtClean="0"/>
-              <a:t>26/06/2023</a:t>
+              <a:t>27/06/2023</a:t>
             </a:fld>
             <a:endParaRPr lang="en-NL"/>
           </a:p>
@@ -2682,7 +2757,7 @@
           <a:p>
             <a:fld id="{15F53109-975B-0047-9CEE-14A150D71685}" type="datetimeFigureOut">
               <a:rPr lang="en-NL" smtClean="0"/>
-              <a:t>26/06/2023</a:t>
+              <a:t>27/06/2023</a:t>
             </a:fld>
             <a:endParaRPr lang="en-NL"/>
           </a:p>
@@ -2925,7 +3000,7 @@
           <a:p>
             <a:fld id="{15F53109-975B-0047-9CEE-14A150D71685}" type="datetimeFigureOut">
               <a:rPr lang="en-NL" smtClean="0"/>
-              <a:t>26/06/2023</a:t>
+              <a:t>27/06/2023</a:t>
             </a:fld>
             <a:endParaRPr lang="en-NL"/>
           </a:p>
@@ -3405,6 +3480,599 @@
 </p:sld>
 </file>
 
+<file path=ppt/slides/slide2.xml><?xml version="1.0" encoding="utf-8"?>
+<p:sld xmlns:a="http://schemas.openxmlformats.org/drawingml/2006/main" xmlns:r="http://schemas.openxmlformats.org/officeDocument/2006/relationships" xmlns:p="http://schemas.openxmlformats.org/presentationml/2006/main">
+  <p:cSld>
+    <p:spTree>
+      <p:nvGrpSpPr>
+        <p:cNvPr id="1" name=""/>
+        <p:cNvGrpSpPr/>
+        <p:nvPr/>
+      </p:nvGrpSpPr>
+      <p:grpSpPr>
+        <a:xfrm>
+          <a:off x="0" y="0"/>
+          <a:ext cx="0" cy="0"/>
+          <a:chOff x="0" y="0"/>
+          <a:chExt cx="0" cy="0"/>
+        </a:xfrm>
+      </p:grpSpPr>
+      <p:pic>
+        <p:nvPicPr>
+          <p:cNvPr id="2" name="Graphic 1">
+            <a:extLst>
+              <a:ext uri="{FF2B5EF4-FFF2-40B4-BE49-F238E27FC236}">
+                <a16:creationId xmlns:a16="http://schemas.microsoft.com/office/drawing/2014/main" id="{9F25BF6D-8FD5-3D87-5254-BBAA854DD96E}"/>
+              </a:ext>
+            </a:extLst>
+          </p:cNvPr>
+          <p:cNvPicPr>
+            <a:picLocks noChangeAspect="1"/>
+          </p:cNvPicPr>
+          <p:nvPr/>
+        </p:nvPicPr>
+        <p:blipFill>
+          <a:blip r:embed="rId2">
+            <a:extLst>
+              <a:ext uri="{28A0092B-C50C-407E-A947-70E740481C1C}">
+                <a14:useLocalDpi xmlns:a14="http://schemas.microsoft.com/office/drawing/2010/main" val="0"/>
+              </a:ext>
+              <a:ext uri="{96DAC541-7B7A-43D3-8B79-37D633B846F1}">
+                <asvg:svgBlip xmlns:asvg="http://schemas.microsoft.com/office/drawing/2016/SVG/main" r:embed="rId3"/>
+              </a:ext>
+            </a:extLst>
+          </a:blip>
+          <a:stretch>
+            <a:fillRect/>
+          </a:stretch>
+        </p:blipFill>
+        <p:spPr>
+          <a:xfrm>
+            <a:off x="6318919" y="2200275"/>
+            <a:ext cx="2505075" cy="2457450"/>
+          </a:xfrm>
+          <a:prstGeom prst="rect">
+            <a:avLst/>
+          </a:prstGeom>
+        </p:spPr>
+      </p:pic>
+      <p:pic>
+        <p:nvPicPr>
+          <p:cNvPr id="3" name="Graphic 2">
+            <a:extLst>
+              <a:ext uri="{FF2B5EF4-FFF2-40B4-BE49-F238E27FC236}">
+                <a16:creationId xmlns:a16="http://schemas.microsoft.com/office/drawing/2014/main" id="{DC4A7FC8-941A-048F-138A-85CA5F9344C1}"/>
+              </a:ext>
+            </a:extLst>
+          </p:cNvPr>
+          <p:cNvPicPr>
+            <a:picLocks noChangeAspect="1"/>
+          </p:cNvPicPr>
+          <p:nvPr/>
+        </p:nvPicPr>
+        <p:blipFill>
+          <a:blip r:embed="rId4">
+            <a:extLst>
+              <a:ext uri="{28A0092B-C50C-407E-A947-70E740481C1C}">
+                <a14:useLocalDpi xmlns:a14="http://schemas.microsoft.com/office/drawing/2010/main" val="0"/>
+              </a:ext>
+              <a:ext uri="{96DAC541-7B7A-43D3-8B79-37D633B846F1}">
+                <asvg:svgBlip xmlns:asvg="http://schemas.microsoft.com/office/drawing/2016/SVG/main" r:embed="rId5"/>
+              </a:ext>
+            </a:extLst>
+          </a:blip>
+          <a:stretch>
+            <a:fillRect/>
+          </a:stretch>
+        </p:blipFill>
+        <p:spPr>
+          <a:xfrm>
+            <a:off x="5804569" y="2195512"/>
+            <a:ext cx="3019425" cy="2466975"/>
+          </a:xfrm>
+          <a:prstGeom prst="rect">
+            <a:avLst/>
+          </a:prstGeom>
+        </p:spPr>
+      </p:pic>
+      <p:pic>
+        <p:nvPicPr>
+          <p:cNvPr id="4" name="Graphic 3">
+            <a:extLst>
+              <a:ext uri="{FF2B5EF4-FFF2-40B4-BE49-F238E27FC236}">
+                <a16:creationId xmlns:a16="http://schemas.microsoft.com/office/drawing/2014/main" id="{699A2C8F-E638-2F65-15B1-9C5EE08BD4E7}"/>
+              </a:ext>
+            </a:extLst>
+          </p:cNvPr>
+          <p:cNvPicPr>
+            <a:picLocks noChangeAspect="1"/>
+          </p:cNvPicPr>
+          <p:nvPr/>
+        </p:nvPicPr>
+        <p:blipFill>
+          <a:blip r:embed="rId6">
+            <a:extLst>
+              <a:ext uri="{28A0092B-C50C-407E-A947-70E740481C1C}">
+                <a14:useLocalDpi xmlns:a14="http://schemas.microsoft.com/office/drawing/2010/main" val="0"/>
+              </a:ext>
+              <a:ext uri="{96DAC541-7B7A-43D3-8B79-37D633B846F1}">
+                <asvg:svgBlip xmlns:asvg="http://schemas.microsoft.com/office/drawing/2016/SVG/main" r:embed="rId7"/>
+              </a:ext>
+            </a:extLst>
+          </a:blip>
+          <a:stretch>
+            <a:fillRect/>
+          </a:stretch>
+        </p:blipFill>
+        <p:spPr>
+          <a:xfrm>
+            <a:off x="5804568" y="1982807"/>
+            <a:ext cx="3019425" cy="2495550"/>
+          </a:xfrm>
+          <a:prstGeom prst="rect">
+            <a:avLst/>
+          </a:prstGeom>
+        </p:spPr>
+      </p:pic>
+      <p:pic>
+        <p:nvPicPr>
+          <p:cNvPr id="5" name="Graphic 4">
+            <a:extLst>
+              <a:ext uri="{FF2B5EF4-FFF2-40B4-BE49-F238E27FC236}">
+                <a16:creationId xmlns:a16="http://schemas.microsoft.com/office/drawing/2014/main" id="{BB6E79D4-76A2-22FE-43F7-D28B5FE0F6CD}"/>
+              </a:ext>
+            </a:extLst>
+          </p:cNvPr>
+          <p:cNvPicPr>
+            <a:picLocks noChangeAspect="1"/>
+          </p:cNvPicPr>
+          <p:nvPr/>
+        </p:nvPicPr>
+        <p:blipFill>
+          <a:blip r:embed="rId8">
+            <a:extLst>
+              <a:ext uri="{28A0092B-C50C-407E-A947-70E740481C1C}">
+                <a14:useLocalDpi xmlns:a14="http://schemas.microsoft.com/office/drawing/2010/main" val="0"/>
+              </a:ext>
+              <a:ext uri="{96DAC541-7B7A-43D3-8B79-37D633B846F1}">
+                <asvg:svgBlip xmlns:asvg="http://schemas.microsoft.com/office/drawing/2016/SVG/main" r:embed="rId9"/>
+              </a:ext>
+            </a:extLst>
+          </a:blip>
+          <a:stretch>
+            <a:fillRect/>
+          </a:stretch>
+        </p:blipFill>
+        <p:spPr>
+          <a:xfrm>
+            <a:off x="5804567" y="1969781"/>
+            <a:ext cx="3019425" cy="2495550"/>
+          </a:xfrm>
+          <a:prstGeom prst="rect">
+            <a:avLst/>
+          </a:prstGeom>
+        </p:spPr>
+      </p:pic>
+      <p:pic>
+        <p:nvPicPr>
+          <p:cNvPr id="6" name="Graphic 5">
+            <a:extLst>
+              <a:ext uri="{FF2B5EF4-FFF2-40B4-BE49-F238E27FC236}">
+                <a16:creationId xmlns:a16="http://schemas.microsoft.com/office/drawing/2014/main" id="{DBFD008B-7E0A-D6BD-DA3A-03D68B8571A1}"/>
+              </a:ext>
+            </a:extLst>
+          </p:cNvPr>
+          <p:cNvPicPr>
+            <a:picLocks noChangeAspect="1"/>
+          </p:cNvPicPr>
+          <p:nvPr/>
+        </p:nvPicPr>
+        <p:blipFill>
+          <a:blip r:embed="rId10">
+            <a:extLst>
+              <a:ext uri="{28A0092B-C50C-407E-A947-70E740481C1C}">
+                <a14:useLocalDpi xmlns:a14="http://schemas.microsoft.com/office/drawing/2010/main" val="0"/>
+              </a:ext>
+              <a:ext uri="{96DAC541-7B7A-43D3-8B79-37D633B846F1}">
+                <asvg:svgBlip xmlns:asvg="http://schemas.microsoft.com/office/drawing/2016/SVG/main" r:embed="rId11"/>
+              </a:ext>
+            </a:extLst>
+          </a:blip>
+          <a:stretch>
+            <a:fillRect/>
+          </a:stretch>
+        </p:blipFill>
+        <p:spPr>
+          <a:xfrm>
+            <a:off x="5804566" y="2162461"/>
+            <a:ext cx="3057525" cy="2457450"/>
+          </a:xfrm>
+          <a:prstGeom prst="rect">
+            <a:avLst/>
+          </a:prstGeom>
+        </p:spPr>
+      </p:pic>
+    </p:spTree>
+    <p:extLst>
+      <p:ext uri="{BB962C8B-B14F-4D97-AF65-F5344CB8AC3E}">
+        <p14:creationId xmlns:p14="http://schemas.microsoft.com/office/powerpoint/2010/main" val="1374573369"/>
+      </p:ext>
+    </p:extLst>
+  </p:cSld>
+  <p:clrMapOvr>
+    <a:masterClrMapping/>
+  </p:clrMapOvr>
+  <p:timing>
+    <p:tnLst>
+      <p:par>
+        <p:cTn id="1" dur="indefinite" restart="never" nodeType="tmRoot">
+          <p:childTnLst>
+            <p:seq concurrent="1" nextAc="seek">
+              <p:cTn id="2" dur="indefinite" nodeType="mainSeq">
+                <p:childTnLst>
+                  <p:par>
+                    <p:cTn id="3" fill="hold">
+                      <p:stCondLst>
+                        <p:cond delay="indefinite"/>
+                      </p:stCondLst>
+                      <p:childTnLst>
+                        <p:par>
+                          <p:cTn id="4" fill="hold">
+                            <p:stCondLst>
+                              <p:cond delay="0"/>
+                            </p:stCondLst>
+                            <p:childTnLst>
+                              <p:par>
+                                <p:cTn id="5" presetID="22" presetClass="entr" presetSubtype="4" fill="hold" nodeType="clickEffect">
+                                  <p:stCondLst>
+                                    <p:cond delay="0"/>
+                                  </p:stCondLst>
+                                  <p:childTnLst>
+                                    <p:set>
+                                      <p:cBhvr>
+                                        <p:cTn id="6" dur="1" fill="hold">
+                                          <p:stCondLst>
+                                            <p:cond delay="0"/>
+                                          </p:stCondLst>
+                                        </p:cTn>
+                                        <p:tgtEl>
+                                          <p:spTgt spid="3"/>
+                                        </p:tgtEl>
+                                        <p:attrNameLst>
+                                          <p:attrName>style.visibility</p:attrName>
+                                        </p:attrNameLst>
+                                      </p:cBhvr>
+                                      <p:to>
+                                        <p:strVal val="visible"/>
+                                      </p:to>
+                                    </p:set>
+                                    <p:animEffect transition="in" filter="wipe(down)">
+                                      <p:cBhvr>
+                                        <p:cTn id="7" dur="800"/>
+                                        <p:tgtEl>
+                                          <p:spTgt spid="3"/>
+                                        </p:tgtEl>
+                                      </p:cBhvr>
+                                    </p:animEffect>
+                                  </p:childTnLst>
+                                </p:cTn>
+                              </p:par>
+                            </p:childTnLst>
+                          </p:cTn>
+                        </p:par>
+                      </p:childTnLst>
+                    </p:cTn>
+                  </p:par>
+                  <p:par>
+                    <p:cTn id="8" fill="hold">
+                      <p:stCondLst>
+                        <p:cond delay="indefinite"/>
+                      </p:stCondLst>
+                      <p:childTnLst>
+                        <p:par>
+                          <p:cTn id="9" fill="hold">
+                            <p:stCondLst>
+                              <p:cond delay="0"/>
+                            </p:stCondLst>
+                            <p:childTnLst>
+                              <p:par>
+                                <p:cTn id="10" presetID="1" presetClass="exit" presetSubtype="0" fill="hold" nodeType="clickEffect">
+                                  <p:stCondLst>
+                                    <p:cond delay="0"/>
+                                  </p:stCondLst>
+                                  <p:childTnLst>
+                                    <p:set>
+                                      <p:cBhvr>
+                                        <p:cTn id="11" dur="1" fill="hold">
+                                          <p:stCondLst>
+                                            <p:cond delay="0"/>
+                                          </p:stCondLst>
+                                        </p:cTn>
+                                        <p:tgtEl>
+                                          <p:spTgt spid="2"/>
+                                        </p:tgtEl>
+                                        <p:attrNameLst>
+                                          <p:attrName>style.visibility</p:attrName>
+                                        </p:attrNameLst>
+                                      </p:cBhvr>
+                                      <p:to>
+                                        <p:strVal val="hidden"/>
+                                      </p:to>
+                                    </p:set>
+                                  </p:childTnLst>
+                                </p:cTn>
+                              </p:par>
+                            </p:childTnLst>
+                          </p:cTn>
+                        </p:par>
+                        <p:par>
+                          <p:cTn id="12" fill="hold">
+                            <p:stCondLst>
+                              <p:cond delay="0"/>
+                            </p:stCondLst>
+                            <p:childTnLst>
+                              <p:par>
+                                <p:cTn id="13" presetID="1" presetClass="exit" presetSubtype="0" fill="hold" nodeType="afterEffect">
+                                  <p:stCondLst>
+                                    <p:cond delay="0"/>
+                                  </p:stCondLst>
+                                  <p:childTnLst>
+                                    <p:set>
+                                      <p:cBhvr>
+                                        <p:cTn id="14" dur="1" fill="hold">
+                                          <p:stCondLst>
+                                            <p:cond delay="0"/>
+                                          </p:stCondLst>
+                                        </p:cTn>
+                                        <p:tgtEl>
+                                          <p:spTgt spid="3"/>
+                                        </p:tgtEl>
+                                        <p:attrNameLst>
+                                          <p:attrName>style.visibility</p:attrName>
+                                        </p:attrNameLst>
+                                      </p:cBhvr>
+                                      <p:to>
+                                        <p:strVal val="hidden"/>
+                                      </p:to>
+                                    </p:set>
+                                  </p:childTnLst>
+                                </p:cTn>
+                              </p:par>
+                              <p:par>
+                                <p:cTn id="15" presetID="1" presetClass="entr" presetSubtype="0" fill="hold" nodeType="withEffect">
+                                  <p:stCondLst>
+                                    <p:cond delay="0"/>
+                                  </p:stCondLst>
+                                  <p:childTnLst>
+                                    <p:set>
+                                      <p:cBhvr>
+                                        <p:cTn id="16" dur="1" fill="hold">
+                                          <p:stCondLst>
+                                            <p:cond delay="0"/>
+                                          </p:stCondLst>
+                                        </p:cTn>
+                                        <p:tgtEl>
+                                          <p:spTgt spid="4"/>
+                                        </p:tgtEl>
+                                        <p:attrNameLst>
+                                          <p:attrName>style.visibility</p:attrName>
+                                        </p:attrNameLst>
+                                      </p:cBhvr>
+                                      <p:to>
+                                        <p:strVal val="visible"/>
+                                      </p:to>
+                                    </p:set>
+                                  </p:childTnLst>
+                                </p:cTn>
+                              </p:par>
+                            </p:childTnLst>
+                          </p:cTn>
+                        </p:par>
+                      </p:childTnLst>
+                    </p:cTn>
+                  </p:par>
+                  <p:par>
+                    <p:cTn id="17" fill="hold">
+                      <p:stCondLst>
+                        <p:cond delay="indefinite"/>
+                      </p:stCondLst>
+                      <p:childTnLst>
+                        <p:par>
+                          <p:cTn id="18" fill="hold">
+                            <p:stCondLst>
+                              <p:cond delay="0"/>
+                            </p:stCondLst>
+                            <p:childTnLst>
+                              <p:par>
+                                <p:cTn id="19" presetID="22" presetClass="entr" presetSubtype="1" fill="hold" nodeType="clickEffect">
+                                  <p:stCondLst>
+                                    <p:cond delay="0"/>
+                                  </p:stCondLst>
+                                  <p:childTnLst>
+                                    <p:set>
+                                      <p:cBhvr>
+                                        <p:cTn id="20" dur="1" fill="hold">
+                                          <p:stCondLst>
+                                            <p:cond delay="0"/>
+                                          </p:stCondLst>
+                                        </p:cTn>
+                                        <p:tgtEl>
+                                          <p:spTgt spid="5"/>
+                                        </p:tgtEl>
+                                        <p:attrNameLst>
+                                          <p:attrName>style.visibility</p:attrName>
+                                        </p:attrNameLst>
+                                      </p:cBhvr>
+                                      <p:to>
+                                        <p:strVal val="visible"/>
+                                      </p:to>
+                                    </p:set>
+                                    <p:animEffect transition="in" filter="wipe(up)">
+                                      <p:cBhvr>
+                                        <p:cTn id="21" dur="500"/>
+                                        <p:tgtEl>
+                                          <p:spTgt spid="5"/>
+                                        </p:tgtEl>
+                                      </p:cBhvr>
+                                    </p:animEffect>
+                                  </p:childTnLst>
+                                </p:cTn>
+                              </p:par>
+                            </p:childTnLst>
+                          </p:cTn>
+                        </p:par>
+                        <p:par>
+                          <p:cTn id="22" fill="hold">
+                            <p:stCondLst>
+                              <p:cond delay="500"/>
+                            </p:stCondLst>
+                            <p:childTnLst>
+                              <p:par>
+                                <p:cTn id="23" presetID="1" presetClass="exit" presetSubtype="0" fill="hold" nodeType="afterEffect">
+                                  <p:stCondLst>
+                                    <p:cond delay="0"/>
+                                  </p:stCondLst>
+                                  <p:childTnLst>
+                                    <p:set>
+                                      <p:cBhvr>
+                                        <p:cTn id="24" dur="1" fill="hold">
+                                          <p:stCondLst>
+                                            <p:cond delay="0"/>
+                                          </p:stCondLst>
+                                        </p:cTn>
+                                        <p:tgtEl>
+                                          <p:spTgt spid="4"/>
+                                        </p:tgtEl>
+                                        <p:attrNameLst>
+                                          <p:attrName>style.visibility</p:attrName>
+                                        </p:attrNameLst>
+                                      </p:cBhvr>
+                                      <p:to>
+                                        <p:strVal val="hidden"/>
+                                      </p:to>
+                                    </p:set>
+                                  </p:childTnLst>
+                                </p:cTn>
+                              </p:par>
+                            </p:childTnLst>
+                          </p:cTn>
+                        </p:par>
+                      </p:childTnLst>
+                    </p:cTn>
+                  </p:par>
+                  <p:par>
+                    <p:cTn id="25" fill="hold">
+                      <p:stCondLst>
+                        <p:cond delay="indefinite"/>
+                      </p:stCondLst>
+                      <p:childTnLst>
+                        <p:par>
+                          <p:cTn id="26" fill="hold">
+                            <p:stCondLst>
+                              <p:cond delay="0"/>
+                            </p:stCondLst>
+                            <p:childTnLst>
+                              <p:par>
+                                <p:cTn id="27" presetID="22" presetClass="entr" presetSubtype="8" fill="hold" nodeType="clickEffect">
+                                  <p:stCondLst>
+                                    <p:cond delay="0"/>
+                                  </p:stCondLst>
+                                  <p:childTnLst>
+                                    <p:set>
+                                      <p:cBhvr>
+                                        <p:cTn id="28" dur="1" fill="hold">
+                                          <p:stCondLst>
+                                            <p:cond delay="0"/>
+                                          </p:stCondLst>
+                                        </p:cTn>
+                                        <p:tgtEl>
+                                          <p:spTgt spid="6"/>
+                                        </p:tgtEl>
+                                        <p:attrNameLst>
+                                          <p:attrName>style.visibility</p:attrName>
+                                        </p:attrNameLst>
+                                      </p:cBhvr>
+                                      <p:to>
+                                        <p:strVal val="visible"/>
+                                      </p:to>
+                                    </p:set>
+                                    <p:animEffect transition="in" filter="wipe(left)">
+                                      <p:cBhvr>
+                                        <p:cTn id="29" dur="500"/>
+                                        <p:tgtEl>
+                                          <p:spTgt spid="6"/>
+                                        </p:tgtEl>
+                                      </p:cBhvr>
+                                    </p:animEffect>
+                                  </p:childTnLst>
+                                </p:cTn>
+                              </p:par>
+                              <p:par>
+                                <p:cTn id="30" presetID="22" presetClass="exit" presetSubtype="8" fill="hold" nodeType="withEffect">
+                                  <p:stCondLst>
+                                    <p:cond delay="0"/>
+                                  </p:stCondLst>
+                                  <p:childTnLst>
+                                    <p:animEffect transition="out" filter="wipe(left)">
+                                      <p:cBhvr>
+                                        <p:cTn id="31" dur="500"/>
+                                        <p:tgtEl>
+                                          <p:spTgt spid="5"/>
+                                        </p:tgtEl>
+                                      </p:cBhvr>
+                                    </p:animEffect>
+                                    <p:set>
+                                      <p:cBhvr>
+                                        <p:cTn id="32" dur="1" fill="hold">
+                                          <p:stCondLst>
+                                            <p:cond delay="499"/>
+                                          </p:stCondLst>
+                                        </p:cTn>
+                                        <p:tgtEl>
+                                          <p:spTgt spid="5"/>
+                                        </p:tgtEl>
+                                        <p:attrNameLst>
+                                          <p:attrName>style.visibility</p:attrName>
+                                        </p:attrNameLst>
+                                      </p:cBhvr>
+                                      <p:to>
+                                        <p:strVal val="hidden"/>
+                                      </p:to>
+                                    </p:set>
+                                  </p:childTnLst>
+                                </p:cTn>
+                              </p:par>
+                            </p:childTnLst>
+                          </p:cTn>
+                        </p:par>
+                      </p:childTnLst>
+                    </p:cTn>
+                  </p:par>
+                </p:childTnLst>
+              </p:cTn>
+              <p:prevCondLst>
+                <p:cond evt="onPrev" delay="0">
+                  <p:tgtEl>
+                    <p:sldTgt/>
+                  </p:tgtEl>
+                </p:cond>
+              </p:prevCondLst>
+              <p:nextCondLst>
+                <p:cond evt="onNext" delay="0">
+                  <p:tgtEl>
+                    <p:sldTgt/>
+                  </p:tgtEl>
+                </p:cond>
+              </p:nextCondLst>
+            </p:seq>
+          </p:childTnLst>
+        </p:cTn>
+      </p:par>
+    </p:tnLst>
+  </p:timing>
+</p:sld>
+</file>
+
 <file path=ppt/theme/theme1.xml><?xml version="1.0" encoding="utf-8"?>
 <a:theme xmlns:a="http://schemas.openxmlformats.org/drawingml/2006/main" name="Office Theme">
   <a:themeElements>

</xml_diff>

<commit_message>
i wasnt sure if i uploaded the most recent
</commit_message>
<xml_diff>
--- a/Animation/Animation.pptx
+++ b/Animation/Animation.pptx
@@ -7,6 +7,7 @@
   <p:sldIdLst>
     <p:sldId id="256" r:id="rId2"/>
     <p:sldId id="257" r:id="rId3"/>
+    <p:sldId id="258" r:id="rId4"/>
   </p:sldIdLst>
   <p:sldSz cx="12192000" cy="6858000"/>
   <p:notesSz cx="6858000" cy="9144000"/>
@@ -3419,54 +3420,78 @@
       </p:grpSpPr>
       <p:sp>
         <p:nvSpPr>
-          <p:cNvPr id="2" name="Title 1">
-            <a:extLst>
-              <a:ext uri="{FF2B5EF4-FFF2-40B4-BE49-F238E27FC236}">
-                <a16:creationId xmlns:a16="http://schemas.microsoft.com/office/drawing/2014/main" id="{BF9FAE29-08FA-D4A6-6765-1847A6976C56}"/>
-              </a:ext>
-            </a:extLst>
-          </p:cNvPr>
-          <p:cNvSpPr>
-            <a:spLocks noGrp="1"/>
-          </p:cNvSpPr>
-          <p:nvPr>
-            <p:ph type="ctrTitle"/>
-          </p:nvPr>
-        </p:nvSpPr>
-        <p:spPr/>
-        <p:txBody>
-          <a:bodyPr/>
-          <a:lstStyle/>
-          <a:p>
-            <a:endParaRPr lang="en-NL"/>
-          </a:p>
-        </p:txBody>
-      </p:sp>
-      <p:sp>
-        <p:nvSpPr>
-          <p:cNvPr id="3" name="Subtitle 2">
-            <a:extLst>
-              <a:ext uri="{FF2B5EF4-FFF2-40B4-BE49-F238E27FC236}">
-                <a16:creationId xmlns:a16="http://schemas.microsoft.com/office/drawing/2014/main" id="{9D4AAA43-A021-AAFF-D6C1-3F5E678DB6DD}"/>
-              </a:ext>
-            </a:extLst>
-          </p:cNvPr>
-          <p:cNvSpPr>
-            <a:spLocks noGrp="1"/>
-          </p:cNvSpPr>
-          <p:nvPr>
-            <p:ph type="subTitle" idx="1"/>
-          </p:nvPr>
-        </p:nvSpPr>
-        <p:spPr/>
-        <p:txBody>
-          <a:bodyPr/>
-          <a:lstStyle/>
-          <a:p>
-            <a:endParaRPr lang="en-NL"/>
-          </a:p>
-        </p:txBody>
-      </p:sp>
+          <p:cNvPr id="4" name="TextBox 3">
+            <a:extLst>
+              <a:ext uri="{FF2B5EF4-FFF2-40B4-BE49-F238E27FC236}">
+                <a16:creationId xmlns:a16="http://schemas.microsoft.com/office/drawing/2014/main" id="{5E49A84F-BEDC-E787-0F25-FE2A3D161B05}"/>
+              </a:ext>
+            </a:extLst>
+          </p:cNvPr>
+          <p:cNvSpPr txBox="1"/>
+          <p:nvPr/>
+        </p:nvSpPr>
+        <p:spPr>
+          <a:xfrm>
+            <a:off x="674574" y="443407"/>
+            <a:ext cx="10842851" cy="3416320"/>
+          </a:xfrm>
+          <a:prstGeom prst="rect">
+            <a:avLst/>
+          </a:prstGeom>
+          <a:noFill/>
+        </p:spPr>
+        <p:txBody>
+          <a:bodyPr wrap="square" rtlCol="0">
+            <a:spAutoFit/>
+          </a:bodyPr>
+          <a:lstStyle/>
+          <a:p>
+            <a:pPr algn="ctr"/>
+            <a:r>
+              <a:rPr lang="en-NL" sz="7200" dirty="0"/>
+              <a:t>What happens when you reflect t</a:t>
+            </a:r>
+            <a:r>
+              <a:rPr lang="en-GB" sz="7200" dirty="0"/>
+              <a:t>he</a:t>
+            </a:r>
+            <a:r>
+              <a:rPr lang="en-NL" sz="7200" dirty="0"/>
+              <a:t> output of a diode laser back upon itself?</a:t>
+            </a:r>
+          </a:p>
+        </p:txBody>
+      </p:sp>
+      <p:pic>
+        <p:nvPicPr>
+          <p:cNvPr id="5" name="Picture 4" descr="A picture containing screenshot, colorfulness, graphics&#10;&#10;Description automatically generated">
+            <a:extLst>
+              <a:ext uri="{FF2B5EF4-FFF2-40B4-BE49-F238E27FC236}">
+                <a16:creationId xmlns:a16="http://schemas.microsoft.com/office/drawing/2014/main" id="{A8CAF447-3ED3-CE13-B279-CD43520C804D}"/>
+              </a:ext>
+            </a:extLst>
+          </p:cNvPr>
+          <p:cNvPicPr>
+            <a:picLocks noChangeAspect="1"/>
+          </p:cNvPicPr>
+          <p:nvPr/>
+        </p:nvPicPr>
+        <p:blipFill>
+          <a:blip r:embed="rId2"/>
+          <a:stretch>
+            <a:fillRect/>
+          </a:stretch>
+        </p:blipFill>
+        <p:spPr>
+          <a:xfrm>
+            <a:off x="2062954" y="3429000"/>
+            <a:ext cx="8066089" cy="3572899"/>
+          </a:xfrm>
+          <a:prstGeom prst="rect">
+            <a:avLst/>
+          </a:prstGeom>
+        </p:spPr>
+      </p:pic>
     </p:spTree>
     <p:extLst>
       <p:ext uri="{BB962C8B-B14F-4D97-AF65-F5344CB8AC3E}">
@@ -4073,6 +4098,66 @@
 </p:sld>
 </file>
 
+<file path=ppt/slides/slide3.xml><?xml version="1.0" encoding="utf-8"?>
+<p:sld xmlns:a="http://schemas.openxmlformats.org/drawingml/2006/main" xmlns:r="http://schemas.openxmlformats.org/officeDocument/2006/relationships" xmlns:p="http://schemas.openxmlformats.org/presentationml/2006/main">
+  <p:cSld>
+    <p:spTree>
+      <p:nvGrpSpPr>
+        <p:cNvPr id="1" name=""/>
+        <p:cNvGrpSpPr/>
+        <p:nvPr/>
+      </p:nvGrpSpPr>
+      <p:grpSpPr>
+        <a:xfrm>
+          <a:off x="0" y="0"/>
+          <a:ext cx="0" cy="0"/>
+          <a:chOff x="0" y="0"/>
+          <a:chExt cx="0" cy="0"/>
+        </a:xfrm>
+      </p:grpSpPr>
+      <p:pic>
+        <p:nvPicPr>
+          <p:cNvPr id="11" name="Picture 10" descr="A screenshot of a video game&#10;&#10;Description automatically generated with medium confidence">
+            <a:extLst>
+              <a:ext uri="{FF2B5EF4-FFF2-40B4-BE49-F238E27FC236}">
+                <a16:creationId xmlns:a16="http://schemas.microsoft.com/office/drawing/2014/main" id="{FC3104D2-7D84-50B8-C2FB-C93C8169DA1B}"/>
+              </a:ext>
+            </a:extLst>
+          </p:cNvPr>
+          <p:cNvPicPr>
+            <a:picLocks noChangeAspect="1"/>
+          </p:cNvPicPr>
+          <p:nvPr/>
+        </p:nvPicPr>
+        <p:blipFill>
+          <a:blip r:embed="rId2"/>
+          <a:stretch>
+            <a:fillRect/>
+          </a:stretch>
+        </p:blipFill>
+        <p:spPr>
+          <a:xfrm>
+            <a:off x="1701165" y="887175"/>
+            <a:ext cx="8789670" cy="5083650"/>
+          </a:xfrm>
+          <a:prstGeom prst="rect">
+            <a:avLst/>
+          </a:prstGeom>
+        </p:spPr>
+      </p:pic>
+    </p:spTree>
+    <p:extLst>
+      <p:ext uri="{BB962C8B-B14F-4D97-AF65-F5344CB8AC3E}">
+        <p14:creationId xmlns:p14="http://schemas.microsoft.com/office/powerpoint/2010/main" val="3689616406"/>
+      </p:ext>
+    </p:extLst>
+  </p:cSld>
+  <p:clrMapOvr>
+    <a:masterClrMapping/>
+  </p:clrMapOvr>
+</p:sld>
+</file>
+
 <file path=ppt/theme/theme1.xml><?xml version="1.0" encoding="utf-8"?>
 <a:theme xmlns:a="http://schemas.openxmlformats.org/drawingml/2006/main" name="Office Theme">
   <a:themeElements>

</xml_diff>

<commit_message>
Made animation for more energy level diagram
</commit_message>
<xml_diff>
--- a/Animation/Animation.pptx
+++ b/Animation/Animation.pptx
@@ -8,6 +8,7 @@
     <p:sldId id="256" r:id="rId2"/>
     <p:sldId id="257" r:id="rId3"/>
     <p:sldId id="258" r:id="rId4"/>
+    <p:sldId id="259" r:id="rId5"/>
   </p:sldIdLst>
   <p:sldSz cx="12192000" cy="6858000"/>
   <p:notesSz cx="6858000" cy="9144000"/>
@@ -118,6 +119,7 @@
 <p1510:revInfo xmlns:a="http://schemas.openxmlformats.org/drawingml/2006/main" xmlns:r="http://schemas.openxmlformats.org/officeDocument/2006/relationships" xmlns:p1510="http://schemas.microsoft.com/office/powerpoint/2015/10/main">
   <p1510:revLst>
     <p1510:client id="{6EDADB15-9C7A-42F9-9C22-D7323EA05313}" v="1" dt="2023-06-27T08:43:12.002"/>
+    <p1510:client id="{7A9DC1BC-797A-4F3D-A7F8-196B740CAC2F}" v="18" dt="2023-06-27T11:34:19.228"/>
   </p1510:revLst>
 </p1510:revInfo>
 </file>
@@ -175,6 +177,101 @@
             <pc:docMk/>
             <pc:sldMk cId="1374573369" sldId="257"/>
             <ac:picMk id="6" creationId="{DBFD008B-7E0A-D6BD-DA3A-03D68B8571A1}"/>
+          </ac:picMkLst>
+        </pc:picChg>
+      </pc:sldChg>
+    </pc:docChg>
+  </pc:docChgLst>
+  <pc:docChgLst>
+    <pc:chgData name="Emils Zegers" userId="bd5cf22c-0e97-44c0-acad-9bc9915da531" providerId="ADAL" clId="{7A9DC1BC-797A-4F3D-A7F8-196B740CAC2F}"/>
+    <pc:docChg chg="addSld modSld">
+      <pc:chgData name="Emils Zegers" userId="bd5cf22c-0e97-44c0-acad-9bc9915da531" providerId="ADAL" clId="{7A9DC1BC-797A-4F3D-A7F8-196B740CAC2F}" dt="2023-06-27T11:38:59.956" v="236" actId="1076"/>
+      <pc:docMkLst>
+        <pc:docMk/>
+      </pc:docMkLst>
+      <pc:sldChg chg="modSp mod">
+        <pc:chgData name="Emils Zegers" userId="bd5cf22c-0e97-44c0-acad-9bc9915da531" providerId="ADAL" clId="{7A9DC1BC-797A-4F3D-A7F8-196B740CAC2F}" dt="2023-06-27T11:38:59.956" v="236" actId="1076"/>
+        <pc:sldMkLst>
+          <pc:docMk/>
+          <pc:sldMk cId="1374573369" sldId="257"/>
+        </pc:sldMkLst>
+        <pc:picChg chg="mod">
+          <ac:chgData name="Emils Zegers" userId="bd5cf22c-0e97-44c0-acad-9bc9915da531" providerId="ADAL" clId="{7A9DC1BC-797A-4F3D-A7F8-196B740CAC2F}" dt="2023-06-27T11:38:59.956" v="236" actId="1076"/>
+          <ac:picMkLst>
+            <pc:docMk/>
+            <pc:sldMk cId="1374573369" sldId="257"/>
+            <ac:picMk id="2" creationId="{9F25BF6D-8FD5-3D87-5254-BBAA854DD96E}"/>
+          </ac:picMkLst>
+        </pc:picChg>
+        <pc:picChg chg="mod">
+          <ac:chgData name="Emils Zegers" userId="bd5cf22c-0e97-44c0-acad-9bc9915da531" providerId="ADAL" clId="{7A9DC1BC-797A-4F3D-A7F8-196B740CAC2F}" dt="2023-06-27T11:38:59.956" v="236" actId="1076"/>
+          <ac:picMkLst>
+            <pc:docMk/>
+            <pc:sldMk cId="1374573369" sldId="257"/>
+            <ac:picMk id="3" creationId="{DC4A7FC8-941A-048F-138A-85CA5F9344C1}"/>
+          </ac:picMkLst>
+        </pc:picChg>
+        <pc:picChg chg="mod">
+          <ac:chgData name="Emils Zegers" userId="bd5cf22c-0e97-44c0-acad-9bc9915da531" providerId="ADAL" clId="{7A9DC1BC-797A-4F3D-A7F8-196B740CAC2F}" dt="2023-06-27T11:38:59.956" v="236" actId="1076"/>
+          <ac:picMkLst>
+            <pc:docMk/>
+            <pc:sldMk cId="1374573369" sldId="257"/>
+            <ac:picMk id="4" creationId="{699A2C8F-E638-2F65-15B1-9C5EE08BD4E7}"/>
+          </ac:picMkLst>
+        </pc:picChg>
+        <pc:picChg chg="mod">
+          <ac:chgData name="Emils Zegers" userId="bd5cf22c-0e97-44c0-acad-9bc9915da531" providerId="ADAL" clId="{7A9DC1BC-797A-4F3D-A7F8-196B740CAC2F}" dt="2023-06-27T11:38:59.956" v="236" actId="1076"/>
+          <ac:picMkLst>
+            <pc:docMk/>
+            <pc:sldMk cId="1374573369" sldId="257"/>
+            <ac:picMk id="5" creationId="{BB6E79D4-76A2-22FE-43F7-D28B5FE0F6CD}"/>
+          </ac:picMkLst>
+        </pc:picChg>
+        <pc:picChg chg="mod">
+          <ac:chgData name="Emils Zegers" userId="bd5cf22c-0e97-44c0-acad-9bc9915da531" providerId="ADAL" clId="{7A9DC1BC-797A-4F3D-A7F8-196B740CAC2F}" dt="2023-06-27T11:38:59.956" v="236" actId="1076"/>
+          <ac:picMkLst>
+            <pc:docMk/>
+            <pc:sldMk cId="1374573369" sldId="257"/>
+            <ac:picMk id="6" creationId="{DBFD008B-7E0A-D6BD-DA3A-03D68B8571A1}"/>
+          </ac:picMkLst>
+        </pc:picChg>
+      </pc:sldChg>
+      <pc:sldChg chg="addSp modSp new mod modAnim">
+        <pc:chgData name="Emils Zegers" userId="bd5cf22c-0e97-44c0-acad-9bc9915da531" providerId="ADAL" clId="{7A9DC1BC-797A-4F3D-A7F8-196B740CAC2F}" dt="2023-06-27T11:37:25.204" v="185" actId="1076"/>
+        <pc:sldMkLst>
+          <pc:docMk/>
+          <pc:sldMk cId="3317067810" sldId="259"/>
+        </pc:sldMkLst>
+        <pc:picChg chg="add mod">
+          <ac:chgData name="Emils Zegers" userId="bd5cf22c-0e97-44c0-acad-9bc9915da531" providerId="ADAL" clId="{7A9DC1BC-797A-4F3D-A7F8-196B740CAC2F}" dt="2023-06-27T11:37:25.204" v="185" actId="1076"/>
+          <ac:picMkLst>
+            <pc:docMk/>
+            <pc:sldMk cId="3317067810" sldId="259"/>
+            <ac:picMk id="3" creationId="{00E564E6-A6DE-20AA-E9B0-2B068B0D08DA}"/>
+          </ac:picMkLst>
+        </pc:picChg>
+        <pc:picChg chg="add mod">
+          <ac:chgData name="Emils Zegers" userId="bd5cf22c-0e97-44c0-acad-9bc9915da531" providerId="ADAL" clId="{7A9DC1BC-797A-4F3D-A7F8-196B740CAC2F}" dt="2023-06-27T11:37:25.204" v="185" actId="1076"/>
+          <ac:picMkLst>
+            <pc:docMk/>
+            <pc:sldMk cId="3317067810" sldId="259"/>
+            <ac:picMk id="5" creationId="{CC24C6B8-8F5A-DBEF-18E3-4368411BD981}"/>
+          </ac:picMkLst>
+        </pc:picChg>
+        <pc:picChg chg="add mod ord">
+          <ac:chgData name="Emils Zegers" userId="bd5cf22c-0e97-44c0-acad-9bc9915da531" providerId="ADAL" clId="{7A9DC1BC-797A-4F3D-A7F8-196B740CAC2F}" dt="2023-06-27T11:37:25.204" v="185" actId="1076"/>
+          <ac:picMkLst>
+            <pc:docMk/>
+            <pc:sldMk cId="3317067810" sldId="259"/>
+            <ac:picMk id="7" creationId="{57B2D7F1-8996-FA18-C6A3-B68600D831C7}"/>
+          </ac:picMkLst>
+        </pc:picChg>
+        <pc:picChg chg="add mod ord">
+          <ac:chgData name="Emils Zegers" userId="bd5cf22c-0e97-44c0-acad-9bc9915da531" providerId="ADAL" clId="{7A9DC1BC-797A-4F3D-A7F8-196B740CAC2F}" dt="2023-06-27T11:37:25.204" v="185" actId="1076"/>
+          <ac:picMkLst>
+            <pc:docMk/>
+            <pc:sldMk cId="3317067810" sldId="259"/>
+            <ac:picMk id="9" creationId="{28B57DEB-BA54-11FB-A196-F11BFA4412E8}"/>
           </ac:picMkLst>
         </pc:picChg>
       </pc:sldChg>
@@ -3553,7 +3650,7 @@
         </p:blipFill>
         <p:spPr>
           <a:xfrm>
-            <a:off x="6318919" y="2200275"/>
+            <a:off x="4674269" y="1927225"/>
             <a:ext cx="2505075" cy="2457450"/>
           </a:xfrm>
           <a:prstGeom prst="rect">
@@ -3592,7 +3689,7 @@
         </p:blipFill>
         <p:spPr>
           <a:xfrm>
-            <a:off x="5804569" y="2195512"/>
+            <a:off x="4159919" y="1920875"/>
             <a:ext cx="3019425" cy="2466975"/>
           </a:xfrm>
           <a:prstGeom prst="rect">
@@ -3631,7 +3728,7 @@
         </p:blipFill>
         <p:spPr>
           <a:xfrm>
-            <a:off x="5804568" y="1982807"/>
+            <a:off x="4159918" y="1728807"/>
             <a:ext cx="3019425" cy="2495550"/>
           </a:xfrm>
           <a:prstGeom prst="rect">
@@ -3670,7 +3767,7 @@
         </p:blipFill>
         <p:spPr>
           <a:xfrm>
-            <a:off x="5804567" y="1969781"/>
+            <a:off x="4157410" y="1728807"/>
             <a:ext cx="3019425" cy="2495550"/>
           </a:xfrm>
           <a:prstGeom prst="rect">
@@ -3709,7 +3806,7 @@
         </p:blipFill>
         <p:spPr>
           <a:xfrm>
-            <a:off x="5804566" y="2162461"/>
+            <a:off x="4161252" y="1925637"/>
             <a:ext cx="3057525" cy="2457450"/>
           </a:xfrm>
           <a:prstGeom prst="rect">
@@ -4158,6 +4255,477 @@
 </p:sld>
 </file>
 
+<file path=ppt/slides/slide4.xml><?xml version="1.0" encoding="utf-8"?>
+<p:sld xmlns:a="http://schemas.openxmlformats.org/drawingml/2006/main" xmlns:r="http://schemas.openxmlformats.org/officeDocument/2006/relationships" xmlns:p="http://schemas.openxmlformats.org/presentationml/2006/main">
+  <p:cSld>
+    <p:spTree>
+      <p:nvGrpSpPr>
+        <p:cNvPr id="1" name=""/>
+        <p:cNvGrpSpPr/>
+        <p:nvPr/>
+      </p:nvGrpSpPr>
+      <p:grpSpPr>
+        <a:xfrm>
+          <a:off x="0" y="0"/>
+          <a:ext cx="0" cy="0"/>
+          <a:chOff x="0" y="0"/>
+          <a:chExt cx="0" cy="0"/>
+        </a:xfrm>
+      </p:grpSpPr>
+      <p:pic>
+        <p:nvPicPr>
+          <p:cNvPr id="3" name="Graphic 2">
+            <a:extLst>
+              <a:ext uri="{FF2B5EF4-FFF2-40B4-BE49-F238E27FC236}">
+                <a16:creationId xmlns:a16="http://schemas.microsoft.com/office/drawing/2014/main" id="{00E564E6-A6DE-20AA-E9B0-2B068B0D08DA}"/>
+              </a:ext>
+            </a:extLst>
+          </p:cNvPr>
+          <p:cNvPicPr>
+            <a:picLocks noChangeAspect="1"/>
+          </p:cNvPicPr>
+          <p:nvPr/>
+        </p:nvPicPr>
+        <p:blipFill>
+          <a:blip r:embed="rId2">
+            <a:extLst>
+              <a:ext uri="{96DAC541-7B7A-43D3-8B79-37D633B846F1}">
+                <asvg:svgBlip xmlns:asvg="http://schemas.microsoft.com/office/drawing/2016/SVG/main" r:embed="rId3"/>
+              </a:ext>
+            </a:extLst>
+          </a:blip>
+          <a:stretch>
+            <a:fillRect/>
+          </a:stretch>
+        </p:blipFill>
+        <p:spPr>
+          <a:xfrm>
+            <a:off x="4360182" y="1335677"/>
+            <a:ext cx="3019425" cy="3886200"/>
+          </a:xfrm>
+          <a:prstGeom prst="rect">
+            <a:avLst/>
+          </a:prstGeom>
+        </p:spPr>
+      </p:pic>
+      <p:pic>
+        <p:nvPicPr>
+          <p:cNvPr id="7" name="Graphic 6">
+            <a:extLst>
+              <a:ext uri="{FF2B5EF4-FFF2-40B4-BE49-F238E27FC236}">
+                <a16:creationId xmlns:a16="http://schemas.microsoft.com/office/drawing/2014/main" id="{57B2D7F1-8996-FA18-C6A3-B68600D831C7}"/>
+              </a:ext>
+            </a:extLst>
+          </p:cNvPr>
+          <p:cNvPicPr>
+            <a:picLocks noChangeAspect="1"/>
+          </p:cNvPicPr>
+          <p:nvPr/>
+        </p:nvPicPr>
+        <p:blipFill>
+          <a:blip r:embed="rId4">
+            <a:extLst>
+              <a:ext uri="{96DAC541-7B7A-43D3-8B79-37D633B846F1}">
+                <asvg:svgBlip xmlns:asvg="http://schemas.microsoft.com/office/drawing/2016/SVG/main" r:embed="rId5"/>
+              </a:ext>
+            </a:extLst>
+          </a:blip>
+          <a:stretch>
+            <a:fillRect/>
+          </a:stretch>
+        </p:blipFill>
+        <p:spPr>
+          <a:xfrm>
+            <a:off x="4501152" y="1152797"/>
+            <a:ext cx="2886075" cy="4076700"/>
+          </a:xfrm>
+          <a:prstGeom prst="rect">
+            <a:avLst/>
+          </a:prstGeom>
+        </p:spPr>
+      </p:pic>
+      <p:pic>
+        <p:nvPicPr>
+          <p:cNvPr id="9" name="Graphic 8">
+            <a:extLst>
+              <a:ext uri="{FF2B5EF4-FFF2-40B4-BE49-F238E27FC236}">
+                <a16:creationId xmlns:a16="http://schemas.microsoft.com/office/drawing/2014/main" id="{28B57DEB-BA54-11FB-A196-F11BFA4412E8}"/>
+              </a:ext>
+            </a:extLst>
+          </p:cNvPr>
+          <p:cNvPicPr>
+            <a:picLocks noChangeAspect="1"/>
+          </p:cNvPicPr>
+          <p:nvPr/>
+        </p:nvPicPr>
+        <p:blipFill>
+          <a:blip r:embed="rId6">
+            <a:extLst>
+              <a:ext uri="{96DAC541-7B7A-43D3-8B79-37D633B846F1}">
+                <asvg:svgBlip xmlns:asvg="http://schemas.microsoft.com/office/drawing/2016/SVG/main" r:embed="rId7"/>
+              </a:ext>
+            </a:extLst>
+          </a:blip>
+          <a:stretch>
+            <a:fillRect/>
+          </a:stretch>
+        </p:blipFill>
+        <p:spPr>
+          <a:xfrm>
+            <a:off x="4501152" y="1152797"/>
+            <a:ext cx="2886075" cy="4076700"/>
+          </a:xfrm>
+          <a:prstGeom prst="rect">
+            <a:avLst/>
+          </a:prstGeom>
+        </p:spPr>
+      </p:pic>
+      <p:pic>
+        <p:nvPicPr>
+          <p:cNvPr id="5" name="Graphic 4">
+            <a:extLst>
+              <a:ext uri="{FF2B5EF4-FFF2-40B4-BE49-F238E27FC236}">
+                <a16:creationId xmlns:a16="http://schemas.microsoft.com/office/drawing/2014/main" id="{CC24C6B8-8F5A-DBEF-18E3-4368411BD981}"/>
+              </a:ext>
+            </a:extLst>
+          </p:cNvPr>
+          <p:cNvPicPr>
+            <a:picLocks noChangeAspect="1"/>
+          </p:cNvPicPr>
+          <p:nvPr/>
+        </p:nvPicPr>
+        <p:blipFill>
+          <a:blip r:embed="rId8">
+            <a:extLst>
+              <a:ext uri="{96DAC541-7B7A-43D3-8B79-37D633B846F1}">
+                <asvg:svgBlip xmlns:asvg="http://schemas.microsoft.com/office/drawing/2016/SVG/main" r:embed="rId9"/>
+              </a:ext>
+            </a:extLst>
+          </a:blip>
+          <a:stretch>
+            <a:fillRect/>
+          </a:stretch>
+        </p:blipFill>
+        <p:spPr>
+          <a:xfrm>
+            <a:off x="4501152" y="1152797"/>
+            <a:ext cx="2886075" cy="4076700"/>
+          </a:xfrm>
+          <a:prstGeom prst="rect">
+            <a:avLst/>
+          </a:prstGeom>
+        </p:spPr>
+      </p:pic>
+    </p:spTree>
+    <p:extLst>
+      <p:ext uri="{BB962C8B-B14F-4D97-AF65-F5344CB8AC3E}">
+        <p14:creationId xmlns:p14="http://schemas.microsoft.com/office/powerpoint/2010/main" val="3317067810"/>
+      </p:ext>
+    </p:extLst>
+  </p:cSld>
+  <p:clrMapOvr>
+    <a:masterClrMapping/>
+  </p:clrMapOvr>
+  <p:timing>
+    <p:tnLst>
+      <p:par>
+        <p:cTn id="1" dur="indefinite" restart="never" nodeType="tmRoot">
+          <p:childTnLst>
+            <p:seq concurrent="1" nextAc="seek">
+              <p:cTn id="2" dur="indefinite" nodeType="mainSeq">
+                <p:childTnLst>
+                  <p:par>
+                    <p:cTn id="3" fill="hold">
+                      <p:stCondLst>
+                        <p:cond delay="indefinite"/>
+                      </p:stCondLst>
+                      <p:childTnLst>
+                        <p:par>
+                          <p:cTn id="4" fill="hold">
+                            <p:stCondLst>
+                              <p:cond delay="0"/>
+                            </p:stCondLst>
+                            <p:childTnLst>
+                              <p:par>
+                                <p:cTn id="5" presetID="22" presetClass="entr" presetSubtype="4" fill="hold" nodeType="clickEffect">
+                                  <p:stCondLst>
+                                    <p:cond delay="0"/>
+                                  </p:stCondLst>
+                                  <p:childTnLst>
+                                    <p:set>
+                                      <p:cBhvr>
+                                        <p:cTn id="6" dur="1" fill="hold">
+                                          <p:stCondLst>
+                                            <p:cond delay="0"/>
+                                          </p:stCondLst>
+                                        </p:cTn>
+                                        <p:tgtEl>
+                                          <p:spTgt spid="3"/>
+                                        </p:tgtEl>
+                                        <p:attrNameLst>
+                                          <p:attrName>style.visibility</p:attrName>
+                                        </p:attrNameLst>
+                                      </p:cBhvr>
+                                      <p:to>
+                                        <p:strVal val="visible"/>
+                                      </p:to>
+                                    </p:set>
+                                    <p:animEffect transition="in" filter="wipe(down)">
+                                      <p:cBhvr>
+                                        <p:cTn id="7" dur="500"/>
+                                        <p:tgtEl>
+                                          <p:spTgt spid="3"/>
+                                        </p:tgtEl>
+                                      </p:cBhvr>
+                                    </p:animEffect>
+                                  </p:childTnLst>
+                                </p:cTn>
+                              </p:par>
+                            </p:childTnLst>
+                          </p:cTn>
+                        </p:par>
+                      </p:childTnLst>
+                    </p:cTn>
+                  </p:par>
+                  <p:par>
+                    <p:cTn id="8" fill="hold">
+                      <p:stCondLst>
+                        <p:cond delay="indefinite"/>
+                      </p:stCondLst>
+                      <p:childTnLst>
+                        <p:par>
+                          <p:cTn id="9" fill="hold">
+                            <p:stCondLst>
+                              <p:cond delay="0"/>
+                            </p:stCondLst>
+                            <p:childTnLst>
+                              <p:par>
+                                <p:cTn id="10" presetID="1" presetClass="exit" presetSubtype="0" fill="hold" nodeType="clickEffect">
+                                  <p:stCondLst>
+                                    <p:cond delay="0"/>
+                                  </p:stCondLst>
+                                  <p:childTnLst>
+                                    <p:set>
+                                      <p:cBhvr>
+                                        <p:cTn id="11" dur="1" fill="hold">
+                                          <p:stCondLst>
+                                            <p:cond delay="0"/>
+                                          </p:stCondLst>
+                                        </p:cTn>
+                                        <p:tgtEl>
+                                          <p:spTgt spid="3"/>
+                                        </p:tgtEl>
+                                        <p:attrNameLst>
+                                          <p:attrName>style.visibility</p:attrName>
+                                        </p:attrNameLst>
+                                      </p:cBhvr>
+                                      <p:to>
+                                        <p:strVal val="hidden"/>
+                                      </p:to>
+                                    </p:set>
+                                  </p:childTnLst>
+                                </p:cTn>
+                              </p:par>
+                              <p:par>
+                                <p:cTn id="12" presetID="1" presetClass="entr" presetSubtype="0" fill="hold" nodeType="withEffect">
+                                  <p:stCondLst>
+                                    <p:cond delay="0"/>
+                                  </p:stCondLst>
+                                  <p:childTnLst>
+                                    <p:set>
+                                      <p:cBhvr>
+                                        <p:cTn id="13" dur="1" fill="hold">
+                                          <p:stCondLst>
+                                            <p:cond delay="0"/>
+                                          </p:stCondLst>
+                                        </p:cTn>
+                                        <p:tgtEl>
+                                          <p:spTgt spid="5"/>
+                                        </p:tgtEl>
+                                        <p:attrNameLst>
+                                          <p:attrName>style.visibility</p:attrName>
+                                        </p:attrNameLst>
+                                      </p:cBhvr>
+                                      <p:to>
+                                        <p:strVal val="visible"/>
+                                      </p:to>
+                                    </p:set>
+                                  </p:childTnLst>
+                                </p:cTn>
+                              </p:par>
+                            </p:childTnLst>
+                          </p:cTn>
+                        </p:par>
+                      </p:childTnLst>
+                    </p:cTn>
+                  </p:par>
+                  <p:par>
+                    <p:cTn id="14" fill="hold">
+                      <p:stCondLst>
+                        <p:cond delay="indefinite"/>
+                      </p:stCondLst>
+                      <p:childTnLst>
+                        <p:par>
+                          <p:cTn id="15" fill="hold">
+                            <p:stCondLst>
+                              <p:cond delay="0"/>
+                            </p:stCondLst>
+                            <p:childTnLst>
+                              <p:par>
+                                <p:cTn id="16" presetID="22" presetClass="entr" presetSubtype="1" fill="hold" nodeType="clickEffect">
+                                  <p:stCondLst>
+                                    <p:cond delay="0"/>
+                                  </p:stCondLst>
+                                  <p:childTnLst>
+                                    <p:set>
+                                      <p:cBhvr>
+                                        <p:cTn id="17" dur="1" fill="hold">
+                                          <p:stCondLst>
+                                            <p:cond delay="0"/>
+                                          </p:stCondLst>
+                                        </p:cTn>
+                                        <p:tgtEl>
+                                          <p:spTgt spid="7"/>
+                                        </p:tgtEl>
+                                        <p:attrNameLst>
+                                          <p:attrName>style.visibility</p:attrName>
+                                        </p:attrNameLst>
+                                      </p:cBhvr>
+                                      <p:to>
+                                        <p:strVal val="visible"/>
+                                      </p:to>
+                                    </p:set>
+                                    <p:animEffect transition="in" filter="wipe(up)">
+                                      <p:cBhvr>
+                                        <p:cTn id="18" dur="500"/>
+                                        <p:tgtEl>
+                                          <p:spTgt spid="7"/>
+                                        </p:tgtEl>
+                                      </p:cBhvr>
+                                    </p:animEffect>
+                                  </p:childTnLst>
+                                </p:cTn>
+                              </p:par>
+                            </p:childTnLst>
+                          </p:cTn>
+                        </p:par>
+                      </p:childTnLst>
+                    </p:cTn>
+                  </p:par>
+                  <p:par>
+                    <p:cTn id="19" fill="hold">
+                      <p:stCondLst>
+                        <p:cond delay="indefinite"/>
+                      </p:stCondLst>
+                      <p:childTnLst>
+                        <p:par>
+                          <p:cTn id="20" fill="hold">
+                            <p:stCondLst>
+                              <p:cond delay="0"/>
+                            </p:stCondLst>
+                            <p:childTnLst>
+                              <p:par>
+                                <p:cTn id="21" presetID="22" presetClass="entr" presetSubtype="8" fill="hold" nodeType="clickEffect">
+                                  <p:stCondLst>
+                                    <p:cond delay="0"/>
+                                  </p:stCondLst>
+                                  <p:childTnLst>
+                                    <p:set>
+                                      <p:cBhvr>
+                                        <p:cTn id="22" dur="1" fill="hold">
+                                          <p:stCondLst>
+                                            <p:cond delay="0"/>
+                                          </p:stCondLst>
+                                        </p:cTn>
+                                        <p:tgtEl>
+                                          <p:spTgt spid="9"/>
+                                        </p:tgtEl>
+                                        <p:attrNameLst>
+                                          <p:attrName>style.visibility</p:attrName>
+                                        </p:attrNameLst>
+                                      </p:cBhvr>
+                                      <p:to>
+                                        <p:strVal val="visible"/>
+                                      </p:to>
+                                    </p:set>
+                                    <p:animEffect transition="in" filter="wipe(left)">
+                                      <p:cBhvr>
+                                        <p:cTn id="23" dur="500"/>
+                                        <p:tgtEl>
+                                          <p:spTgt spid="9"/>
+                                        </p:tgtEl>
+                                      </p:cBhvr>
+                                    </p:animEffect>
+                                  </p:childTnLst>
+                                </p:cTn>
+                              </p:par>
+                            </p:childTnLst>
+                          </p:cTn>
+                        </p:par>
+                        <p:par>
+                          <p:cTn id="24" fill="hold">
+                            <p:stCondLst>
+                              <p:cond delay="500"/>
+                            </p:stCondLst>
+                            <p:childTnLst>
+                              <p:par>
+                                <p:cTn id="25" presetID="1" presetClass="exit" presetSubtype="0" fill="hold" nodeType="afterEffect">
+                                  <p:stCondLst>
+                                    <p:cond delay="0"/>
+                                  </p:stCondLst>
+                                  <p:childTnLst>
+                                    <p:set>
+                                      <p:cBhvr>
+                                        <p:cTn id="26" dur="1" fill="hold">
+                                          <p:stCondLst>
+                                            <p:cond delay="0"/>
+                                          </p:stCondLst>
+                                        </p:cTn>
+                                        <p:tgtEl>
+                                          <p:spTgt spid="7"/>
+                                        </p:tgtEl>
+                                        <p:attrNameLst>
+                                          <p:attrName>style.visibility</p:attrName>
+                                        </p:attrNameLst>
+                                      </p:cBhvr>
+                                      <p:to>
+                                        <p:strVal val="hidden"/>
+                                      </p:to>
+                                    </p:set>
+                                  </p:childTnLst>
+                                </p:cTn>
+                              </p:par>
+                            </p:childTnLst>
+                          </p:cTn>
+                        </p:par>
+                      </p:childTnLst>
+                    </p:cTn>
+                  </p:par>
+                </p:childTnLst>
+              </p:cTn>
+              <p:prevCondLst>
+                <p:cond evt="onPrev" delay="0">
+                  <p:tgtEl>
+                    <p:sldTgt/>
+                  </p:tgtEl>
+                </p:cond>
+              </p:prevCondLst>
+              <p:nextCondLst>
+                <p:cond evt="onNext" delay="0">
+                  <p:tgtEl>
+                    <p:sldTgt/>
+                  </p:tgtEl>
+                </p:cond>
+              </p:nextCondLst>
+            </p:seq>
+          </p:childTnLst>
+        </p:cTn>
+      </p:par>
+    </p:tnLst>
+  </p:timing>
+</p:sld>
+</file>
+
 <file path=ppt/theme/theme1.xml><?xml version="1.0" encoding="utf-8"?>
 <a:theme xmlns:a="http://schemas.openxmlformats.org/drawingml/2006/main" name="Office Theme">
   <a:themeElements>

</xml_diff>

<commit_message>
Animatie van spectrometer af
</commit_message>
<xml_diff>
--- a/Animation/Animation.pptx
+++ b/Animation/Animation.pptx
@@ -7,8 +7,9 @@
   <p:sldIdLst>
     <p:sldId id="256" r:id="rId2"/>
     <p:sldId id="257" r:id="rId3"/>
-    <p:sldId id="258" r:id="rId4"/>
-    <p:sldId id="259" r:id="rId5"/>
+    <p:sldId id="260" r:id="rId4"/>
+    <p:sldId id="258" r:id="rId5"/>
+    <p:sldId id="259" r:id="rId6"/>
   </p:sldIdLst>
   <p:sldSz cx="12192000" cy="6858000"/>
   <p:notesSz cx="6858000" cy="9144000"/>
@@ -119,7 +120,7 @@
 <p1510:revInfo xmlns:a="http://schemas.openxmlformats.org/drawingml/2006/main" xmlns:r="http://schemas.openxmlformats.org/officeDocument/2006/relationships" xmlns:p1510="http://schemas.microsoft.com/office/powerpoint/2015/10/main">
   <p1510:revLst>
     <p1510:client id="{6EDADB15-9C7A-42F9-9C22-D7323EA05313}" v="1" dt="2023-06-27T08:43:12.002"/>
-    <p1510:client id="{7A9DC1BC-797A-4F3D-A7F8-196B740CAC2F}" v="18" dt="2023-06-27T11:34:19.228"/>
+    <p1510:client id="{7A9DC1BC-797A-4F3D-A7F8-196B740CAC2F}" v="51" dt="2023-06-27T12:42:30.824"/>
   </p1510:revLst>
 </p1510:revInfo>
 </file>
@@ -184,8 +185,8 @@
   </pc:docChgLst>
   <pc:docChgLst>
     <pc:chgData name="Emils Zegers" userId="bd5cf22c-0e97-44c0-acad-9bc9915da531" providerId="ADAL" clId="{7A9DC1BC-797A-4F3D-A7F8-196B740CAC2F}"/>
-    <pc:docChg chg="addSld modSld">
-      <pc:chgData name="Emils Zegers" userId="bd5cf22c-0e97-44c0-acad-9bc9915da531" providerId="ADAL" clId="{7A9DC1BC-797A-4F3D-A7F8-196B740CAC2F}" dt="2023-06-27T11:38:59.956" v="236" actId="1076"/>
+    <pc:docChg chg="undo custSel addSld modSld sldOrd">
+      <pc:chgData name="Emils Zegers" userId="bd5cf22c-0e97-44c0-acad-9bc9915da531" providerId="ADAL" clId="{7A9DC1BC-797A-4F3D-A7F8-196B740CAC2F}" dt="2023-06-27T12:45:19.064" v="490" actId="1036"/>
       <pc:docMkLst>
         <pc:docMk/>
       </pc:docMkLst>
@@ -272,6 +273,53 @@
             <pc:docMk/>
             <pc:sldMk cId="3317067810" sldId="259"/>
             <ac:picMk id="9" creationId="{28B57DEB-BA54-11FB-A196-F11BFA4412E8}"/>
+          </ac:picMkLst>
+        </pc:picChg>
+      </pc:sldChg>
+      <pc:sldChg chg="addSp modSp new mod ord modAnim">
+        <pc:chgData name="Emils Zegers" userId="bd5cf22c-0e97-44c0-acad-9bc9915da531" providerId="ADAL" clId="{7A9DC1BC-797A-4F3D-A7F8-196B740CAC2F}" dt="2023-06-27T12:45:19.064" v="490" actId="1036"/>
+        <pc:sldMkLst>
+          <pc:docMk/>
+          <pc:sldMk cId="3584655705" sldId="260"/>
+        </pc:sldMkLst>
+        <pc:picChg chg="add mod modCrop">
+          <ac:chgData name="Emils Zegers" userId="bd5cf22c-0e97-44c0-acad-9bc9915da531" providerId="ADAL" clId="{7A9DC1BC-797A-4F3D-A7F8-196B740CAC2F}" dt="2023-06-27T12:44:47.991" v="458" actId="1076"/>
+          <ac:picMkLst>
+            <pc:docMk/>
+            <pc:sldMk cId="3584655705" sldId="260"/>
+            <ac:picMk id="3" creationId="{0CDF3DF7-D990-59CC-0BA2-C74FC19FDABA}"/>
+          </ac:picMkLst>
+        </pc:picChg>
+        <pc:picChg chg="add mod modCrop">
+          <ac:chgData name="Emils Zegers" userId="bd5cf22c-0e97-44c0-acad-9bc9915da531" providerId="ADAL" clId="{7A9DC1BC-797A-4F3D-A7F8-196B740CAC2F}" dt="2023-06-27T12:44:55.571" v="469" actId="1038"/>
+          <ac:picMkLst>
+            <pc:docMk/>
+            <pc:sldMk cId="3584655705" sldId="260"/>
+            <ac:picMk id="5" creationId="{877ABDB5-C0C2-4B64-A7B4-9A435B5049FC}"/>
+          </ac:picMkLst>
+        </pc:picChg>
+        <pc:picChg chg="add mod modCrop">
+          <ac:chgData name="Emils Zegers" userId="bd5cf22c-0e97-44c0-acad-9bc9915da531" providerId="ADAL" clId="{7A9DC1BC-797A-4F3D-A7F8-196B740CAC2F}" dt="2023-06-27T12:45:05.183" v="477" actId="1035"/>
+          <ac:picMkLst>
+            <pc:docMk/>
+            <pc:sldMk cId="3584655705" sldId="260"/>
+            <ac:picMk id="7" creationId="{3411E620-B303-9BCD-3D8A-C616A81B194C}"/>
+          </ac:picMkLst>
+        </pc:picChg>
+        <pc:picChg chg="add mod modCrop">
+          <ac:chgData name="Emils Zegers" userId="bd5cf22c-0e97-44c0-acad-9bc9915da531" providerId="ADAL" clId="{7A9DC1BC-797A-4F3D-A7F8-196B740CAC2F}" dt="2023-06-27T12:45:13.921" v="487" actId="1036"/>
+          <ac:picMkLst>
+            <pc:docMk/>
+            <pc:sldMk cId="3584655705" sldId="260"/>
+            <ac:picMk id="9" creationId="{51B770E1-E826-B0D7-D251-9FC2B521FFDA}"/>
+          </ac:picMkLst>
+        </pc:picChg>
+        <pc:picChg chg="add mod modCrop">
+          <ac:chgData name="Emils Zegers" userId="bd5cf22c-0e97-44c0-acad-9bc9915da531" providerId="ADAL" clId="{7A9DC1BC-797A-4F3D-A7F8-196B740CAC2F}" dt="2023-06-27T12:45:19.064" v="490" actId="1036"/>
+          <ac:picMkLst>
+            <pc:docMk/>
+            <pc:sldMk cId="3584655705" sldId="260"/>
+            <ac:picMk id="11" creationId="{49B23831-F2B2-05C2-70A5-B8A618C5CFCC}"/>
           </ac:picMkLst>
         </pc:picChg>
       </pc:sldChg>
@@ -4214,6 +4262,529 @@
       </p:grpSpPr>
       <p:pic>
         <p:nvPicPr>
+          <p:cNvPr id="3" name="Graphic 2">
+            <a:extLst>
+              <a:ext uri="{FF2B5EF4-FFF2-40B4-BE49-F238E27FC236}">
+                <a16:creationId xmlns:a16="http://schemas.microsoft.com/office/drawing/2014/main" id="{0CDF3DF7-D990-59CC-0BA2-C74FC19FDABA}"/>
+              </a:ext>
+            </a:extLst>
+          </p:cNvPr>
+          <p:cNvPicPr>
+            <a:picLocks noChangeAspect="1"/>
+          </p:cNvPicPr>
+          <p:nvPr/>
+        </p:nvPicPr>
+        <p:blipFill rotWithShape="1">
+          <a:blip r:embed="rId2">
+            <a:extLst>
+              <a:ext uri="{96DAC541-7B7A-43D3-8B79-37D633B846F1}">
+                <asvg:svgBlip xmlns:asvg="http://schemas.microsoft.com/office/drawing/2016/SVG/main" r:embed="rId3"/>
+              </a:ext>
+            </a:extLst>
+          </a:blip>
+          <a:srcRect r="63874" b="79592"/>
+          <a:stretch/>
+        </p:blipFill>
+        <p:spPr>
+          <a:xfrm>
+            <a:off x="2147808" y="1328144"/>
+            <a:ext cx="7702630" cy="4058564"/>
+          </a:xfrm>
+          <a:prstGeom prst="rect">
+            <a:avLst/>
+          </a:prstGeom>
+        </p:spPr>
+      </p:pic>
+      <p:pic>
+        <p:nvPicPr>
+          <p:cNvPr id="5" name="Graphic 4">
+            <a:extLst>
+              <a:ext uri="{FF2B5EF4-FFF2-40B4-BE49-F238E27FC236}">
+                <a16:creationId xmlns:a16="http://schemas.microsoft.com/office/drawing/2014/main" id="{877ABDB5-C0C2-4B64-A7B4-9A435B5049FC}"/>
+              </a:ext>
+            </a:extLst>
+          </p:cNvPr>
+          <p:cNvPicPr>
+            <a:picLocks noChangeAspect="1"/>
+          </p:cNvPicPr>
+          <p:nvPr/>
+        </p:nvPicPr>
+        <p:blipFill rotWithShape="1">
+          <a:blip r:embed="rId2">
+            <a:extLst>
+              <a:ext uri="{96DAC541-7B7A-43D3-8B79-37D633B846F1}">
+                <asvg:svgBlip xmlns:asvg="http://schemas.microsoft.com/office/drawing/2016/SVG/main" r:embed="rId3"/>
+              </a:ext>
+            </a:extLst>
+          </a:blip>
+          <a:srcRect t="21361" r="62986" b="58231"/>
+          <a:stretch/>
+        </p:blipFill>
+        <p:spPr>
+          <a:xfrm>
+            <a:off x="2162685" y="1145755"/>
+            <a:ext cx="7892029" cy="4058566"/>
+          </a:xfrm>
+          <a:prstGeom prst="rect">
+            <a:avLst/>
+          </a:prstGeom>
+        </p:spPr>
+      </p:pic>
+      <p:pic>
+        <p:nvPicPr>
+          <p:cNvPr id="7" name="Graphic 6">
+            <a:extLst>
+              <a:ext uri="{FF2B5EF4-FFF2-40B4-BE49-F238E27FC236}">
+                <a16:creationId xmlns:a16="http://schemas.microsoft.com/office/drawing/2014/main" id="{3411E620-B303-9BCD-3D8A-C616A81B194C}"/>
+              </a:ext>
+            </a:extLst>
+          </p:cNvPr>
+          <p:cNvPicPr>
+            <a:picLocks noChangeAspect="1"/>
+          </p:cNvPicPr>
+          <p:nvPr/>
+        </p:nvPicPr>
+        <p:blipFill rotWithShape="1">
+          <a:blip r:embed="rId2">
+            <a:extLst>
+              <a:ext uri="{96DAC541-7B7A-43D3-8B79-37D633B846F1}">
+                <asvg:svgBlip xmlns:asvg="http://schemas.microsoft.com/office/drawing/2016/SVG/main" r:embed="rId3"/>
+              </a:ext>
+            </a:extLst>
+          </a:blip>
+          <a:srcRect t="41360" r="62986" b="39321"/>
+          <a:stretch/>
+        </p:blipFill>
+        <p:spPr>
+          <a:xfrm>
+            <a:off x="2164860" y="1302744"/>
+            <a:ext cx="7892032" cy="3842106"/>
+          </a:xfrm>
+          <a:prstGeom prst="rect">
+            <a:avLst/>
+          </a:prstGeom>
+        </p:spPr>
+      </p:pic>
+      <p:pic>
+        <p:nvPicPr>
+          <p:cNvPr id="9" name="Graphic 8">
+            <a:extLst>
+              <a:ext uri="{FF2B5EF4-FFF2-40B4-BE49-F238E27FC236}">
+                <a16:creationId xmlns:a16="http://schemas.microsoft.com/office/drawing/2014/main" id="{51B770E1-E826-B0D7-D251-9FC2B521FFDA}"/>
+              </a:ext>
+            </a:extLst>
+          </p:cNvPr>
+          <p:cNvPicPr>
+            <a:picLocks noChangeAspect="1"/>
+          </p:cNvPicPr>
+          <p:nvPr/>
+        </p:nvPicPr>
+        <p:blipFill rotWithShape="1">
+          <a:blip r:embed="rId2">
+            <a:extLst>
+              <a:ext uri="{96DAC541-7B7A-43D3-8B79-37D633B846F1}">
+                <asvg:svgBlip xmlns:asvg="http://schemas.microsoft.com/office/drawing/2016/SVG/main" r:embed="rId3"/>
+              </a:ext>
+            </a:extLst>
+          </a:blip>
+          <a:srcRect t="60816" r="63874" b="19584"/>
+          <a:stretch/>
+        </p:blipFill>
+        <p:spPr>
+          <a:xfrm>
+            <a:off x="2160508" y="1259180"/>
+            <a:ext cx="7702630" cy="3897911"/>
+          </a:xfrm>
+          <a:prstGeom prst="rect">
+            <a:avLst/>
+          </a:prstGeom>
+        </p:spPr>
+      </p:pic>
+      <p:pic>
+        <p:nvPicPr>
+          <p:cNvPr id="11" name="Graphic 10">
+            <a:extLst>
+              <a:ext uri="{FF2B5EF4-FFF2-40B4-BE49-F238E27FC236}">
+                <a16:creationId xmlns:a16="http://schemas.microsoft.com/office/drawing/2014/main" id="{49B23831-F2B2-05C2-70A5-B8A618C5CFCC}"/>
+              </a:ext>
+            </a:extLst>
+          </p:cNvPr>
+          <p:cNvPicPr>
+            <a:picLocks noChangeAspect="1"/>
+          </p:cNvPicPr>
+          <p:nvPr/>
+        </p:nvPicPr>
+        <p:blipFill rotWithShape="1">
+          <a:blip r:embed="rId2">
+            <a:extLst>
+              <a:ext uri="{96DAC541-7B7A-43D3-8B79-37D633B846F1}">
+                <asvg:svgBlip xmlns:asvg="http://schemas.microsoft.com/office/drawing/2016/SVG/main" r:embed="rId3"/>
+              </a:ext>
+            </a:extLst>
+          </a:blip>
+          <a:srcRect t="80660" r="62986"/>
+          <a:stretch/>
+        </p:blipFill>
+        <p:spPr>
+          <a:xfrm>
+            <a:off x="2164862" y="1336758"/>
+            <a:ext cx="7892029" cy="3846192"/>
+          </a:xfrm>
+          <a:prstGeom prst="rect">
+            <a:avLst/>
+          </a:prstGeom>
+        </p:spPr>
+      </p:pic>
+    </p:spTree>
+    <p:extLst>
+      <p:ext uri="{BB962C8B-B14F-4D97-AF65-F5344CB8AC3E}">
+        <p14:creationId xmlns:p14="http://schemas.microsoft.com/office/powerpoint/2010/main" val="3584655705"/>
+      </p:ext>
+    </p:extLst>
+  </p:cSld>
+  <p:clrMapOvr>
+    <a:masterClrMapping/>
+  </p:clrMapOvr>
+  <p:timing>
+    <p:tnLst>
+      <p:par>
+        <p:cTn id="1" dur="indefinite" restart="never" nodeType="tmRoot">
+          <p:childTnLst>
+            <p:seq concurrent="1" nextAc="seek">
+              <p:cTn id="2" dur="indefinite" nodeType="mainSeq">
+                <p:childTnLst>
+                  <p:par>
+                    <p:cTn id="3" fill="hold">
+                      <p:stCondLst>
+                        <p:cond delay="indefinite"/>
+                      </p:stCondLst>
+                      <p:childTnLst>
+                        <p:par>
+                          <p:cTn id="4" fill="hold">
+                            <p:stCondLst>
+                              <p:cond delay="0"/>
+                            </p:stCondLst>
+                            <p:childTnLst>
+                              <p:par>
+                                <p:cTn id="5" presetID="1" presetClass="exit" presetSubtype="0" fill="hold" nodeType="clickEffect">
+                                  <p:stCondLst>
+                                    <p:cond delay="0"/>
+                                  </p:stCondLst>
+                                  <p:childTnLst>
+                                    <p:set>
+                                      <p:cBhvr>
+                                        <p:cTn id="6" dur="1" fill="hold">
+                                          <p:stCondLst>
+                                            <p:cond delay="0"/>
+                                          </p:stCondLst>
+                                        </p:cTn>
+                                        <p:tgtEl>
+                                          <p:spTgt spid="3"/>
+                                        </p:tgtEl>
+                                        <p:attrNameLst>
+                                          <p:attrName>style.visibility</p:attrName>
+                                        </p:attrNameLst>
+                                      </p:cBhvr>
+                                      <p:to>
+                                        <p:strVal val="hidden"/>
+                                      </p:to>
+                                    </p:set>
+                                  </p:childTnLst>
+                                </p:cTn>
+                              </p:par>
+                              <p:par>
+                                <p:cTn id="7" presetID="1" presetClass="entr" presetSubtype="0" fill="hold" nodeType="withEffect">
+                                  <p:stCondLst>
+                                    <p:cond delay="0"/>
+                                  </p:stCondLst>
+                                  <p:childTnLst>
+                                    <p:set>
+                                      <p:cBhvr>
+                                        <p:cTn id="8" dur="1" fill="hold">
+                                          <p:stCondLst>
+                                            <p:cond delay="0"/>
+                                          </p:stCondLst>
+                                        </p:cTn>
+                                        <p:tgtEl>
+                                          <p:spTgt spid="5"/>
+                                        </p:tgtEl>
+                                        <p:attrNameLst>
+                                          <p:attrName>style.visibility</p:attrName>
+                                        </p:attrNameLst>
+                                      </p:cBhvr>
+                                      <p:to>
+                                        <p:strVal val="visible"/>
+                                      </p:to>
+                                    </p:set>
+                                  </p:childTnLst>
+                                </p:cTn>
+                              </p:par>
+                            </p:childTnLst>
+                          </p:cTn>
+                        </p:par>
+                      </p:childTnLst>
+                    </p:cTn>
+                  </p:par>
+                  <p:par>
+                    <p:cTn id="9" fill="hold">
+                      <p:stCondLst>
+                        <p:cond delay="indefinite"/>
+                      </p:stCondLst>
+                      <p:childTnLst>
+                        <p:par>
+                          <p:cTn id="10" fill="hold">
+                            <p:stCondLst>
+                              <p:cond delay="0"/>
+                            </p:stCondLst>
+                            <p:childTnLst>
+                              <p:par>
+                                <p:cTn id="11" presetID="1" presetClass="exit" presetSubtype="0" fill="hold" nodeType="clickEffect">
+                                  <p:stCondLst>
+                                    <p:cond delay="0"/>
+                                  </p:stCondLst>
+                                  <p:childTnLst>
+                                    <p:set>
+                                      <p:cBhvr>
+                                        <p:cTn id="12" dur="1" fill="hold">
+                                          <p:stCondLst>
+                                            <p:cond delay="0"/>
+                                          </p:stCondLst>
+                                        </p:cTn>
+                                        <p:tgtEl>
+                                          <p:spTgt spid="5"/>
+                                        </p:tgtEl>
+                                        <p:attrNameLst>
+                                          <p:attrName>style.visibility</p:attrName>
+                                        </p:attrNameLst>
+                                      </p:cBhvr>
+                                      <p:to>
+                                        <p:strVal val="hidden"/>
+                                      </p:to>
+                                    </p:set>
+                                  </p:childTnLst>
+                                </p:cTn>
+                              </p:par>
+                              <p:par>
+                                <p:cTn id="13" presetID="1" presetClass="entr" presetSubtype="0" fill="hold" nodeType="withEffect">
+                                  <p:stCondLst>
+                                    <p:cond delay="0"/>
+                                  </p:stCondLst>
+                                  <p:childTnLst>
+                                    <p:set>
+                                      <p:cBhvr>
+                                        <p:cTn id="14" dur="1" fill="hold">
+                                          <p:stCondLst>
+                                            <p:cond delay="0"/>
+                                          </p:stCondLst>
+                                        </p:cTn>
+                                        <p:tgtEl>
+                                          <p:spTgt spid="7"/>
+                                        </p:tgtEl>
+                                        <p:attrNameLst>
+                                          <p:attrName>style.visibility</p:attrName>
+                                        </p:attrNameLst>
+                                      </p:cBhvr>
+                                      <p:to>
+                                        <p:strVal val="visible"/>
+                                      </p:to>
+                                    </p:set>
+                                  </p:childTnLst>
+                                </p:cTn>
+                              </p:par>
+                            </p:childTnLst>
+                          </p:cTn>
+                        </p:par>
+                      </p:childTnLst>
+                    </p:cTn>
+                  </p:par>
+                  <p:par>
+                    <p:cTn id="15" fill="hold">
+                      <p:stCondLst>
+                        <p:cond delay="indefinite"/>
+                      </p:stCondLst>
+                      <p:childTnLst>
+                        <p:par>
+                          <p:cTn id="16" fill="hold">
+                            <p:stCondLst>
+                              <p:cond delay="0"/>
+                            </p:stCondLst>
+                            <p:childTnLst>
+                              <p:par>
+                                <p:cTn id="17" presetID="1" presetClass="exit" presetSubtype="0" fill="hold" nodeType="clickEffect">
+                                  <p:stCondLst>
+                                    <p:cond delay="0"/>
+                                  </p:stCondLst>
+                                  <p:childTnLst>
+                                    <p:set>
+                                      <p:cBhvr>
+                                        <p:cTn id="18" dur="1" fill="hold">
+                                          <p:stCondLst>
+                                            <p:cond delay="0"/>
+                                          </p:stCondLst>
+                                        </p:cTn>
+                                        <p:tgtEl>
+                                          <p:spTgt spid="7"/>
+                                        </p:tgtEl>
+                                        <p:attrNameLst>
+                                          <p:attrName>style.visibility</p:attrName>
+                                        </p:attrNameLst>
+                                      </p:cBhvr>
+                                      <p:to>
+                                        <p:strVal val="hidden"/>
+                                      </p:to>
+                                    </p:set>
+                                  </p:childTnLst>
+                                </p:cTn>
+                              </p:par>
+                              <p:par>
+                                <p:cTn id="19" presetID="1" presetClass="entr" presetSubtype="0" fill="hold" nodeType="withEffect">
+                                  <p:stCondLst>
+                                    <p:cond delay="0"/>
+                                  </p:stCondLst>
+                                  <p:childTnLst>
+                                    <p:set>
+                                      <p:cBhvr>
+                                        <p:cTn id="20" dur="1" fill="hold">
+                                          <p:stCondLst>
+                                            <p:cond delay="0"/>
+                                          </p:stCondLst>
+                                        </p:cTn>
+                                        <p:tgtEl>
+                                          <p:spTgt spid="9"/>
+                                        </p:tgtEl>
+                                        <p:attrNameLst>
+                                          <p:attrName>style.visibility</p:attrName>
+                                        </p:attrNameLst>
+                                      </p:cBhvr>
+                                      <p:to>
+                                        <p:strVal val="visible"/>
+                                      </p:to>
+                                    </p:set>
+                                  </p:childTnLst>
+                                </p:cTn>
+                              </p:par>
+                            </p:childTnLst>
+                          </p:cTn>
+                        </p:par>
+                      </p:childTnLst>
+                    </p:cTn>
+                  </p:par>
+                  <p:par>
+                    <p:cTn id="21" fill="hold">
+                      <p:stCondLst>
+                        <p:cond delay="indefinite"/>
+                      </p:stCondLst>
+                      <p:childTnLst>
+                        <p:par>
+                          <p:cTn id="22" fill="hold">
+                            <p:stCondLst>
+                              <p:cond delay="0"/>
+                            </p:stCondLst>
+                            <p:childTnLst>
+                              <p:par>
+                                <p:cTn id="23" presetID="1" presetClass="exit" presetSubtype="0" fill="hold" nodeType="clickEffect">
+                                  <p:stCondLst>
+                                    <p:cond delay="0"/>
+                                  </p:stCondLst>
+                                  <p:childTnLst>
+                                    <p:set>
+                                      <p:cBhvr>
+                                        <p:cTn id="24" dur="1" fill="hold">
+                                          <p:stCondLst>
+                                            <p:cond delay="0"/>
+                                          </p:stCondLst>
+                                        </p:cTn>
+                                        <p:tgtEl>
+                                          <p:spTgt spid="9"/>
+                                        </p:tgtEl>
+                                        <p:attrNameLst>
+                                          <p:attrName>style.visibility</p:attrName>
+                                        </p:attrNameLst>
+                                      </p:cBhvr>
+                                      <p:to>
+                                        <p:strVal val="hidden"/>
+                                      </p:to>
+                                    </p:set>
+                                  </p:childTnLst>
+                                </p:cTn>
+                              </p:par>
+                              <p:par>
+                                <p:cTn id="25" presetID="1" presetClass="entr" presetSubtype="0" fill="hold" nodeType="withEffect">
+                                  <p:stCondLst>
+                                    <p:cond delay="0"/>
+                                  </p:stCondLst>
+                                  <p:childTnLst>
+                                    <p:set>
+                                      <p:cBhvr>
+                                        <p:cTn id="26" dur="1" fill="hold">
+                                          <p:stCondLst>
+                                            <p:cond delay="0"/>
+                                          </p:stCondLst>
+                                        </p:cTn>
+                                        <p:tgtEl>
+                                          <p:spTgt spid="11"/>
+                                        </p:tgtEl>
+                                        <p:attrNameLst>
+                                          <p:attrName>style.visibility</p:attrName>
+                                        </p:attrNameLst>
+                                      </p:cBhvr>
+                                      <p:to>
+                                        <p:strVal val="visible"/>
+                                      </p:to>
+                                    </p:set>
+                                  </p:childTnLst>
+                                </p:cTn>
+                              </p:par>
+                            </p:childTnLst>
+                          </p:cTn>
+                        </p:par>
+                      </p:childTnLst>
+                    </p:cTn>
+                  </p:par>
+                </p:childTnLst>
+              </p:cTn>
+              <p:prevCondLst>
+                <p:cond evt="onPrev" delay="0">
+                  <p:tgtEl>
+                    <p:sldTgt/>
+                  </p:tgtEl>
+                </p:cond>
+              </p:prevCondLst>
+              <p:nextCondLst>
+                <p:cond evt="onNext" delay="0">
+                  <p:tgtEl>
+                    <p:sldTgt/>
+                  </p:tgtEl>
+                </p:cond>
+              </p:nextCondLst>
+            </p:seq>
+          </p:childTnLst>
+        </p:cTn>
+      </p:par>
+    </p:tnLst>
+  </p:timing>
+</p:sld>
+</file>
+
+<file path=ppt/slides/slide4.xml><?xml version="1.0" encoding="utf-8"?>
+<p:sld xmlns:a="http://schemas.openxmlformats.org/drawingml/2006/main" xmlns:r="http://schemas.openxmlformats.org/officeDocument/2006/relationships" xmlns:p="http://schemas.openxmlformats.org/presentationml/2006/main">
+  <p:cSld>
+    <p:spTree>
+      <p:nvGrpSpPr>
+        <p:cNvPr id="1" name=""/>
+        <p:cNvGrpSpPr/>
+        <p:nvPr/>
+      </p:nvGrpSpPr>
+      <p:grpSpPr>
+        <a:xfrm>
+          <a:off x="0" y="0"/>
+          <a:ext cx="0" cy="0"/>
+          <a:chOff x="0" y="0"/>
+          <a:chExt cx="0" cy="0"/>
+        </a:xfrm>
+      </p:grpSpPr>
+      <p:pic>
+        <p:nvPicPr>
           <p:cNvPr id="11" name="Picture 10" descr="A screenshot of a video game&#10;&#10;Description automatically generated with medium confidence">
             <a:extLst>
               <a:ext uri="{FF2B5EF4-FFF2-40B4-BE49-F238E27FC236}">
@@ -4255,7 +4826,7 @@
 </p:sld>
 </file>
 
-<file path=ppt/slides/slide4.xml><?xml version="1.0" encoding="utf-8"?>
+<file path=ppt/slides/slide5.xml><?xml version="1.0" encoding="utf-8"?>
 <p:sld xmlns:a="http://schemas.openxmlformats.org/drawingml/2006/main" xmlns:r="http://schemas.openxmlformats.org/officeDocument/2006/relationships" xmlns:p="http://schemas.openxmlformats.org/presentationml/2006/main">
   <p:cSld>
     <p:spTree>

</xml_diff>